<commit_message>
Continued the work on the presentation
</commit_message>
<xml_diff>
--- a/Modeling Results.pptx
+++ b/Modeling Results.pptx
@@ -6,21 +6,29 @@
   </p:sldMasterIdLst>
   <p:sldIdLst>
     <p:sldId id="256" r:id="rId2"/>
-    <p:sldId id="260" r:id="rId3"/>
-    <p:sldId id="257" r:id="rId4"/>
-    <p:sldId id="261" r:id="rId5"/>
-    <p:sldId id="262" r:id="rId6"/>
-    <p:sldId id="263" r:id="rId7"/>
-    <p:sldId id="265" r:id="rId8"/>
-    <p:sldId id="266" r:id="rId9"/>
-    <p:sldId id="267" r:id="rId10"/>
-    <p:sldId id="264" r:id="rId11"/>
-    <p:sldId id="270" r:id="rId12"/>
-    <p:sldId id="258" r:id="rId13"/>
-    <p:sldId id="268" r:id="rId14"/>
-    <p:sldId id="269" r:id="rId15"/>
-    <p:sldId id="259" r:id="rId16"/>
-    <p:sldId id="271" r:id="rId17"/>
+    <p:sldId id="280" r:id="rId3"/>
+    <p:sldId id="260" r:id="rId4"/>
+    <p:sldId id="257" r:id="rId5"/>
+    <p:sldId id="261" r:id="rId6"/>
+    <p:sldId id="262" r:id="rId7"/>
+    <p:sldId id="263" r:id="rId8"/>
+    <p:sldId id="265" r:id="rId9"/>
+    <p:sldId id="266" r:id="rId10"/>
+    <p:sldId id="267" r:id="rId11"/>
+    <p:sldId id="264" r:id="rId12"/>
+    <p:sldId id="270" r:id="rId13"/>
+    <p:sldId id="258" r:id="rId14"/>
+    <p:sldId id="268" r:id="rId15"/>
+    <p:sldId id="269" r:id="rId16"/>
+    <p:sldId id="259" r:id="rId17"/>
+    <p:sldId id="273" r:id="rId18"/>
+    <p:sldId id="271" r:id="rId19"/>
+    <p:sldId id="274" r:id="rId20"/>
+    <p:sldId id="275" r:id="rId21"/>
+    <p:sldId id="276" r:id="rId22"/>
+    <p:sldId id="277" r:id="rId23"/>
+    <p:sldId id="279" r:id="rId24"/>
+    <p:sldId id="278" r:id="rId25"/>
   </p:sldIdLst>
   <p:sldSz cx="12192000" cy="6858000"/>
   <p:notesSz cx="6858000" cy="9144000"/>
@@ -276,7 +284,7 @@
           <a:p>
             <a:fld id="{43208139-D7BC-4419-A81A-A3FD5F89F6CD}" type="datetimeFigureOut">
               <a:rPr lang="en-GB" smtClean="0"/>
-              <a:t>12/11/2023</a:t>
+              <a:t>15/11/2023</a:t>
             </a:fld>
             <a:endParaRPr lang="en-GB"/>
           </a:p>
@@ -476,7 +484,7 @@
           <a:p>
             <a:fld id="{43208139-D7BC-4419-A81A-A3FD5F89F6CD}" type="datetimeFigureOut">
               <a:rPr lang="en-GB" smtClean="0"/>
-              <a:t>12/11/2023</a:t>
+              <a:t>15/11/2023</a:t>
             </a:fld>
             <a:endParaRPr lang="en-GB"/>
           </a:p>
@@ -686,7 +694,7 @@
           <a:p>
             <a:fld id="{43208139-D7BC-4419-A81A-A3FD5F89F6CD}" type="datetimeFigureOut">
               <a:rPr lang="en-GB" smtClean="0"/>
-              <a:t>12/11/2023</a:t>
+              <a:t>15/11/2023</a:t>
             </a:fld>
             <a:endParaRPr lang="en-GB"/>
           </a:p>
@@ -886,7 +894,7 @@
           <a:p>
             <a:fld id="{43208139-D7BC-4419-A81A-A3FD5F89F6CD}" type="datetimeFigureOut">
               <a:rPr lang="en-GB" smtClean="0"/>
-              <a:t>12/11/2023</a:t>
+              <a:t>15/11/2023</a:t>
             </a:fld>
             <a:endParaRPr lang="en-GB"/>
           </a:p>
@@ -1162,7 +1170,7 @@
           <a:p>
             <a:fld id="{43208139-D7BC-4419-A81A-A3FD5F89F6CD}" type="datetimeFigureOut">
               <a:rPr lang="en-GB" smtClean="0"/>
-              <a:t>12/11/2023</a:t>
+              <a:t>15/11/2023</a:t>
             </a:fld>
             <a:endParaRPr lang="en-GB"/>
           </a:p>
@@ -1430,7 +1438,7 @@
           <a:p>
             <a:fld id="{43208139-D7BC-4419-A81A-A3FD5F89F6CD}" type="datetimeFigureOut">
               <a:rPr lang="en-GB" smtClean="0"/>
-              <a:t>12/11/2023</a:t>
+              <a:t>15/11/2023</a:t>
             </a:fld>
             <a:endParaRPr lang="en-GB"/>
           </a:p>
@@ -1845,7 +1853,7 @@
           <a:p>
             <a:fld id="{43208139-D7BC-4419-A81A-A3FD5F89F6CD}" type="datetimeFigureOut">
               <a:rPr lang="en-GB" smtClean="0"/>
-              <a:t>12/11/2023</a:t>
+              <a:t>15/11/2023</a:t>
             </a:fld>
             <a:endParaRPr lang="en-GB"/>
           </a:p>
@@ -1987,7 +1995,7 @@
           <a:p>
             <a:fld id="{43208139-D7BC-4419-A81A-A3FD5F89F6CD}" type="datetimeFigureOut">
               <a:rPr lang="en-GB" smtClean="0"/>
-              <a:t>12/11/2023</a:t>
+              <a:t>15/11/2023</a:t>
             </a:fld>
             <a:endParaRPr lang="en-GB"/>
           </a:p>
@@ -2100,7 +2108,7 @@
           <a:p>
             <a:fld id="{43208139-D7BC-4419-A81A-A3FD5F89F6CD}" type="datetimeFigureOut">
               <a:rPr lang="en-GB" smtClean="0"/>
-              <a:t>12/11/2023</a:t>
+              <a:t>15/11/2023</a:t>
             </a:fld>
             <a:endParaRPr lang="en-GB"/>
           </a:p>
@@ -2413,7 +2421,7 @@
           <a:p>
             <a:fld id="{43208139-D7BC-4419-A81A-A3FD5F89F6CD}" type="datetimeFigureOut">
               <a:rPr lang="en-GB" smtClean="0"/>
-              <a:t>12/11/2023</a:t>
+              <a:t>15/11/2023</a:t>
             </a:fld>
             <a:endParaRPr lang="en-GB"/>
           </a:p>
@@ -2702,7 +2710,7 @@
           <a:p>
             <a:fld id="{43208139-D7BC-4419-A81A-A3FD5F89F6CD}" type="datetimeFigureOut">
               <a:rPr lang="en-GB" smtClean="0"/>
-              <a:t>12/11/2023</a:t>
+              <a:t>15/11/2023</a:t>
             </a:fld>
             <a:endParaRPr lang="en-GB"/>
           </a:p>
@@ -2945,7 +2953,7 @@
           <a:p>
             <a:fld id="{43208139-D7BC-4419-A81A-A3FD5F89F6CD}" type="datetimeFigureOut">
               <a:rPr lang="en-GB" smtClean="0"/>
-              <a:t>12/11/2023</a:t>
+              <a:t>15/11/2023</a:t>
             </a:fld>
             <a:endParaRPr lang="en-GB"/>
           </a:p>
@@ -3391,31 +3399,6 @@
           </a:p>
         </p:txBody>
       </p:sp>
-      <p:sp>
-        <p:nvSpPr>
-          <p:cNvPr id="3" name="Subtitle 2">
-            <a:extLst>
-              <a:ext uri="{FF2B5EF4-FFF2-40B4-BE49-F238E27FC236}">
-                <a16:creationId xmlns:a16="http://schemas.microsoft.com/office/drawing/2014/main" id="{674DBB13-0A99-2E04-3569-7E73B4D710DF}"/>
-              </a:ext>
-            </a:extLst>
-          </p:cNvPr>
-          <p:cNvSpPr>
-            <a:spLocks noGrp="1"/>
-          </p:cNvSpPr>
-          <p:nvPr>
-            <p:ph type="subTitle" idx="1"/>
-          </p:nvPr>
-        </p:nvSpPr>
-        <p:spPr/>
-        <p:txBody>
-          <a:bodyPr/>
-          <a:lstStyle/>
-          <a:p>
-            <a:endParaRPr lang="en-GB" dirty="0"/>
-          </a:p>
-        </p:txBody>
-      </p:sp>
     </p:spTree>
     <p:extLst>
       <p:ext uri="{BB962C8B-B14F-4D97-AF65-F5344CB8AC3E}">
@@ -3430,6 +3413,132 @@
 </file>
 
 <file path=ppt/slides/slide10.xml><?xml version="1.0" encoding="utf-8"?>
+<p:sld xmlns:a="http://schemas.openxmlformats.org/drawingml/2006/main" xmlns:r="http://schemas.openxmlformats.org/officeDocument/2006/relationships" xmlns:p="http://schemas.openxmlformats.org/presentationml/2006/main">
+  <p:cSld>
+    <p:spTree>
+      <p:nvGrpSpPr>
+        <p:cNvPr id="1" name=""/>
+        <p:cNvGrpSpPr/>
+        <p:nvPr/>
+      </p:nvGrpSpPr>
+      <p:grpSpPr>
+        <a:xfrm>
+          <a:off x="0" y="0"/>
+          <a:ext cx="0" cy="0"/>
+          <a:chOff x="0" y="0"/>
+          <a:chExt cx="0" cy="0"/>
+        </a:xfrm>
+      </p:grpSpPr>
+      <p:sp>
+        <p:nvSpPr>
+          <p:cNvPr id="2" name="Title 1">
+            <a:extLst>
+              <a:ext uri="{FF2B5EF4-FFF2-40B4-BE49-F238E27FC236}">
+                <a16:creationId xmlns:a16="http://schemas.microsoft.com/office/drawing/2014/main" id="{6B806895-1D5F-4602-547D-0D03C14414C4}"/>
+              </a:ext>
+            </a:extLst>
+          </p:cNvPr>
+          <p:cNvSpPr>
+            <a:spLocks noGrp="1"/>
+          </p:cNvSpPr>
+          <p:nvPr>
+            <p:ph type="title"/>
+          </p:nvPr>
+        </p:nvSpPr>
+        <p:spPr/>
+        <p:txBody>
+          <a:bodyPr/>
+          <a:lstStyle/>
+          <a:p>
+            <a:r>
+              <a:rPr lang="en-US" dirty="0"/>
+              <a:t>Spatial-Only Model</a:t>
+            </a:r>
+            <a:endParaRPr lang="en-GB" dirty="0"/>
+          </a:p>
+        </p:txBody>
+      </p:sp>
+      <p:sp>
+        <p:nvSpPr>
+          <p:cNvPr id="3" name="Content Placeholder 2">
+            <a:extLst>
+              <a:ext uri="{FF2B5EF4-FFF2-40B4-BE49-F238E27FC236}">
+                <a16:creationId xmlns:a16="http://schemas.microsoft.com/office/drawing/2014/main" id="{215A26A4-CDF1-26D9-A6CD-320D31C2CD2E}"/>
+              </a:ext>
+            </a:extLst>
+          </p:cNvPr>
+          <p:cNvSpPr>
+            <a:spLocks noGrp="1"/>
+          </p:cNvSpPr>
+          <p:nvPr>
+            <p:ph idx="1"/>
+          </p:nvPr>
+        </p:nvSpPr>
+        <p:spPr/>
+        <p:txBody>
+          <a:bodyPr/>
+          <a:lstStyle/>
+          <a:p>
+            <a:r>
+              <a:rPr lang="en-US" dirty="0"/>
+              <a:t>4 Parameters (s1, s2, s3, s4)</a:t>
+            </a:r>
+          </a:p>
+          <a:p>
+            <a:r>
+              <a:rPr lang="en-US" dirty="0"/>
+              <a:t>Defined as: sLevelValue.</a:t>
+            </a:r>
+          </a:p>
+          <a:p>
+            <a:endParaRPr lang="en-GB" dirty="0"/>
+          </a:p>
+        </p:txBody>
+      </p:sp>
+      <p:pic>
+        <p:nvPicPr>
+          <p:cNvPr id="6" name="Picture 5">
+            <a:extLst>
+              <a:ext uri="{FF2B5EF4-FFF2-40B4-BE49-F238E27FC236}">
+                <a16:creationId xmlns:a16="http://schemas.microsoft.com/office/drawing/2014/main" id="{5AF132EB-0D9C-B7FD-1B40-95D0D00A231A}"/>
+              </a:ext>
+            </a:extLst>
+          </p:cNvPr>
+          <p:cNvPicPr>
+            <a:picLocks noChangeAspect="1"/>
+          </p:cNvPicPr>
+          <p:nvPr/>
+        </p:nvPicPr>
+        <p:blipFill>
+          <a:blip r:embed="rId2"/>
+          <a:stretch>
+            <a:fillRect/>
+          </a:stretch>
+        </p:blipFill>
+        <p:spPr>
+          <a:xfrm>
+            <a:off x="6096000" y="1690688"/>
+            <a:ext cx="4972050" cy="4267200"/>
+          </a:xfrm>
+          <a:prstGeom prst="rect">
+            <a:avLst/>
+          </a:prstGeom>
+        </p:spPr>
+      </p:pic>
+    </p:spTree>
+    <p:extLst>
+      <p:ext uri="{BB962C8B-B14F-4D97-AF65-F5344CB8AC3E}">
+        <p14:creationId xmlns:p14="http://schemas.microsoft.com/office/powerpoint/2010/main" val="1547859141"/>
+      </p:ext>
+    </p:extLst>
+  </p:cSld>
+  <p:clrMapOvr>
+    <a:masterClrMapping/>
+  </p:clrMapOvr>
+</p:sld>
+</file>
+
+<file path=ppt/slides/slide11.xml><?xml version="1.0" encoding="utf-8"?>
 <p:sld xmlns:a="http://schemas.openxmlformats.org/drawingml/2006/main" xmlns:r="http://schemas.openxmlformats.org/officeDocument/2006/relationships" xmlns:p="http://schemas.openxmlformats.org/presentationml/2006/main">
   <p:cSld>
     <p:spTree>
@@ -3783,7 +3892,7 @@
 </p:sld>
 </file>
 
-<file path=ppt/slides/slide11.xml><?xml version="1.0" encoding="utf-8"?>
+<file path=ppt/slides/slide12.xml><?xml version="1.0" encoding="utf-8"?>
 <p:sld xmlns:a="http://schemas.openxmlformats.org/drawingml/2006/main" xmlns:r="http://schemas.openxmlformats.org/officeDocument/2006/relationships" xmlns:p="http://schemas.openxmlformats.org/presentationml/2006/main">
   <p:cSld>
     <p:spTree>
@@ -3802,10 +3911,10 @@
       </p:grpSpPr>
       <p:pic>
         <p:nvPicPr>
-          <p:cNvPr id="7" name="Picture 6">
-            <a:extLst>
-              <a:ext uri="{FF2B5EF4-FFF2-40B4-BE49-F238E27FC236}">
-                <a16:creationId xmlns:a16="http://schemas.microsoft.com/office/drawing/2014/main" id="{14EA18B7-1003-6374-CF13-28B67C3CE803}"/>
+          <p:cNvPr id="9" name="Picture 8">
+            <a:extLst>
+              <a:ext uri="{FF2B5EF4-FFF2-40B4-BE49-F238E27FC236}">
+                <a16:creationId xmlns:a16="http://schemas.microsoft.com/office/drawing/2014/main" id="{6A5438B4-C745-8366-4112-1B906DF6F8BA}"/>
               </a:ext>
             </a:extLst>
           </p:cNvPr>
@@ -3816,36 +3925,6 @@
         </p:nvPicPr>
         <p:blipFill>
           <a:blip r:embed="rId2"/>
-          <a:stretch>
-            <a:fillRect/>
-          </a:stretch>
-        </p:blipFill>
-        <p:spPr>
-          <a:xfrm>
-            <a:off x="7012164" y="0"/>
-            <a:ext cx="4847897" cy="6858000"/>
-          </a:xfrm>
-          <a:prstGeom prst="rect">
-            <a:avLst/>
-          </a:prstGeom>
-        </p:spPr>
-      </p:pic>
-      <p:pic>
-        <p:nvPicPr>
-          <p:cNvPr id="9" name="Picture 8">
-            <a:extLst>
-              <a:ext uri="{FF2B5EF4-FFF2-40B4-BE49-F238E27FC236}">
-                <a16:creationId xmlns:a16="http://schemas.microsoft.com/office/drawing/2014/main" id="{6A5438B4-C745-8366-4112-1B906DF6F8BA}"/>
-              </a:ext>
-            </a:extLst>
-          </p:cNvPr>
-          <p:cNvPicPr>
-            <a:picLocks noChangeAspect="1"/>
-          </p:cNvPicPr>
-          <p:nvPr/>
-        </p:nvPicPr>
-        <p:blipFill>
-          <a:blip r:embed="rId3"/>
           <a:stretch>
             <a:fillRect/>
           </a:stretch>
@@ -3896,115 +3975,40 @@
           </a:p>
         </p:txBody>
       </p:sp>
+      <p:pic>
+        <p:nvPicPr>
+          <p:cNvPr id="3" name="Picture 2">
+            <a:extLst>
+              <a:ext uri="{FF2B5EF4-FFF2-40B4-BE49-F238E27FC236}">
+                <a16:creationId xmlns:a16="http://schemas.microsoft.com/office/drawing/2014/main" id="{384A5FE2-0197-E348-F2EA-24E59BFD533C}"/>
+              </a:ext>
+            </a:extLst>
+          </p:cNvPr>
+          <p:cNvPicPr>
+            <a:picLocks noChangeAspect="1"/>
+          </p:cNvPicPr>
+          <p:nvPr/>
+        </p:nvPicPr>
+        <p:blipFill>
+          <a:blip r:embed="rId3"/>
+          <a:stretch>
+            <a:fillRect/>
+          </a:stretch>
+        </p:blipFill>
+        <p:spPr>
+          <a:xfrm>
+            <a:off x="7012163" y="0"/>
+            <a:ext cx="4839867" cy="6858000"/>
+          </a:xfrm>
+          <a:prstGeom prst="rect">
+            <a:avLst/>
+          </a:prstGeom>
+        </p:spPr>
+      </p:pic>
     </p:spTree>
     <p:extLst>
       <p:ext uri="{BB962C8B-B14F-4D97-AF65-F5344CB8AC3E}">
         <p14:creationId xmlns:p14="http://schemas.microsoft.com/office/powerpoint/2010/main" val="729672363"/>
-      </p:ext>
-    </p:extLst>
-  </p:cSld>
-  <p:clrMapOvr>
-    <a:masterClrMapping/>
-  </p:clrMapOvr>
-</p:sld>
-</file>
-
-<file path=ppt/slides/slide12.xml><?xml version="1.0" encoding="utf-8"?>
-<p:sld xmlns:a="http://schemas.openxmlformats.org/drawingml/2006/main" xmlns:r="http://schemas.openxmlformats.org/officeDocument/2006/relationships" xmlns:p="http://schemas.openxmlformats.org/presentationml/2006/main">
-  <p:cSld>
-    <p:spTree>
-      <p:nvGrpSpPr>
-        <p:cNvPr id="1" name=""/>
-        <p:cNvGrpSpPr/>
-        <p:nvPr/>
-      </p:nvGrpSpPr>
-      <p:grpSpPr>
-        <a:xfrm>
-          <a:off x="0" y="0"/>
-          <a:ext cx="0" cy="0"/>
-          <a:chOff x="0" y="0"/>
-          <a:chExt cx="0" cy="0"/>
-        </a:xfrm>
-      </p:grpSpPr>
-      <p:sp>
-        <p:nvSpPr>
-          <p:cNvPr id="2" name="Title 1">
-            <a:extLst>
-              <a:ext uri="{FF2B5EF4-FFF2-40B4-BE49-F238E27FC236}">
-                <a16:creationId xmlns:a16="http://schemas.microsoft.com/office/drawing/2014/main" id="{41D20670-FA42-2965-FF13-34E80E6406F2}"/>
-              </a:ext>
-            </a:extLst>
-          </p:cNvPr>
-          <p:cNvSpPr>
-            <a:spLocks noGrp="1"/>
-          </p:cNvSpPr>
-          <p:nvPr>
-            <p:ph type="title"/>
-          </p:nvPr>
-        </p:nvSpPr>
-        <p:spPr/>
-        <p:txBody>
-          <a:bodyPr/>
-          <a:lstStyle/>
-          <a:p>
-            <a:r>
-              <a:rPr lang="en-US" dirty="0"/>
-              <a:t>Model Evaluation</a:t>
-            </a:r>
-            <a:endParaRPr lang="en-GB" dirty="0"/>
-          </a:p>
-        </p:txBody>
-      </p:sp>
-      <p:sp>
-        <p:nvSpPr>
-          <p:cNvPr id="3" name="Content Placeholder 2">
-            <a:extLst>
-              <a:ext uri="{FF2B5EF4-FFF2-40B4-BE49-F238E27FC236}">
-                <a16:creationId xmlns:a16="http://schemas.microsoft.com/office/drawing/2014/main" id="{C62CD8C3-7EC4-578F-8183-07CE73DDE021}"/>
-              </a:ext>
-            </a:extLst>
-          </p:cNvPr>
-          <p:cNvSpPr>
-            <a:spLocks noGrp="1"/>
-          </p:cNvSpPr>
-          <p:nvPr>
-            <p:ph idx="1"/>
-          </p:nvPr>
-        </p:nvSpPr>
-        <p:spPr/>
-        <p:txBody>
-          <a:bodyPr/>
-          <a:lstStyle/>
-          <a:p>
-            <a:r>
-              <a:rPr lang="en-US" dirty="0"/>
-              <a:t>BADS optimizer</a:t>
-            </a:r>
-          </a:p>
-          <a:p>
-            <a:r>
-              <a:rPr lang="en-US" dirty="0"/>
-              <a:t>Objective Function</a:t>
-            </a:r>
-          </a:p>
-          <a:p>
-            <a:pPr marL="0" indent="0">
-              <a:buNone/>
-            </a:pPr>
-            <a:endParaRPr lang="en-US" dirty="0"/>
-          </a:p>
-          <a:p>
-            <a:pPr marL="0" indent="0">
-              <a:buNone/>
-            </a:pPr>
-            <a:endParaRPr lang="en-GB" dirty="0"/>
-          </a:p>
-        </p:txBody>
-      </p:sp>
-    </p:spTree>
-    <p:extLst>
-      <p:ext uri="{BB962C8B-B14F-4D97-AF65-F5344CB8AC3E}">
-        <p14:creationId xmlns:p14="http://schemas.microsoft.com/office/powerpoint/2010/main" val="782054948"/>
       </p:ext>
     </p:extLst>
   </p:cSld>
@@ -4036,7 +4040,7 @@
           <p:cNvPr id="2" name="Title 1">
             <a:extLst>
               <a:ext uri="{FF2B5EF4-FFF2-40B4-BE49-F238E27FC236}">
-                <a16:creationId xmlns:a16="http://schemas.microsoft.com/office/drawing/2014/main" id="{37C46591-94B5-B68F-F07C-30A46AF097CE}"/>
+                <a16:creationId xmlns:a16="http://schemas.microsoft.com/office/drawing/2014/main" id="{41D20670-FA42-2965-FF13-34E80E6406F2}"/>
               </a:ext>
             </a:extLst>
           </p:cNvPr>
@@ -4049,16 +4053,14 @@
         </p:nvSpPr>
         <p:spPr/>
         <p:txBody>
-          <a:bodyPr>
-            <a:normAutofit/>
-          </a:bodyPr>
-          <a:lstStyle/>
-          <a:p>
-            <a:r>
-              <a:rPr lang="en-US" sz="4000" dirty="0"/>
-              <a:t>Bayesian Adaptive Direct Search (BADS) Optimizer</a:t>
-            </a:r>
-            <a:endParaRPr lang="en-GB" sz="4000" dirty="0"/>
+          <a:bodyPr/>
+          <a:lstStyle/>
+          <a:p>
+            <a:r>
+              <a:rPr lang="en-US" dirty="0"/>
+              <a:t>Model Evaluation</a:t>
+            </a:r>
+            <a:endParaRPr lang="en-GB" dirty="0"/>
           </a:p>
         </p:txBody>
       </p:sp>
@@ -4067,7 +4069,7 @@
           <p:cNvPr id="3" name="Content Placeholder 2">
             <a:extLst>
               <a:ext uri="{FF2B5EF4-FFF2-40B4-BE49-F238E27FC236}">
-                <a16:creationId xmlns:a16="http://schemas.microsoft.com/office/drawing/2014/main" id="{D6D84666-3F83-D115-7883-951F3E3B390D}"/>
+                <a16:creationId xmlns:a16="http://schemas.microsoft.com/office/drawing/2014/main" id="{C62CD8C3-7EC4-578F-8183-07CE73DDE021}"/>
               </a:ext>
             </a:extLst>
           </p:cNvPr>
@@ -4080,58 +4082,38 @@
         </p:nvSpPr>
         <p:spPr/>
         <p:txBody>
-          <a:bodyPr>
-            <a:normAutofit lnSpcReduction="10000"/>
-          </a:bodyPr>
-          <a:lstStyle/>
-          <a:p>
-            <a:r>
-              <a:rPr lang="en-US" dirty="0"/>
-              <a:t>x0 = [0.5 0.5 0.5 0.5]  	% Starting points (multiple starting points 					% were used to avoid local minimums)</a:t>
-            </a:r>
-          </a:p>
-          <a:p>
-            <a:r>
-              <a:rPr lang="en-US" dirty="0"/>
-              <a:t>lb = [0 0 0 0]		% Lower bounds</a:t>
-            </a:r>
-          </a:p>
-          <a:p>
-            <a:r>
-              <a:rPr lang="en-US" dirty="0"/>
-              <a:t>ub = [1 1 1 1]		% Upper bounds</a:t>
-            </a:r>
-          </a:p>
-          <a:p>
-            <a:r>
-              <a:rPr lang="en-US" dirty="0"/>
-              <a:t>plb = [0.5 0.3 0.1 0]	% Plausible lower bounds (was not used due 				% to high variance between subjects)</a:t>
-            </a:r>
-          </a:p>
-          <a:p>
-            <a:r>
-              <a:rPr lang="en-GB" dirty="0"/>
-              <a:t>pub = [1 0.9 0.7 0.6]	% Plausible upper bounds (was not used due 				% to high variance between subjects)</a:t>
-            </a:r>
-          </a:p>
-          <a:p>
-            <a:r>
-              <a:rPr lang="en-GB" dirty="0"/>
-              <a:t>nonbcon = @nonbcon 	% Non-bound constraint function</a:t>
-            </a:r>
-          </a:p>
-          <a:p>
-            <a:r>
-              <a:rPr lang="en-GB" dirty="0"/>
-              <a:t>bads(objective_function, x0, lb, ub, plb, pub, nonbcon)</a:t>
-            </a:r>
+          <a:bodyPr/>
+          <a:lstStyle/>
+          <a:p>
+            <a:r>
+              <a:rPr lang="en-US" dirty="0"/>
+              <a:t>BADS optimizer</a:t>
+            </a:r>
+          </a:p>
+          <a:p>
+            <a:r>
+              <a:rPr lang="en-US" dirty="0"/>
+              <a:t>Objective Function</a:t>
+            </a:r>
+          </a:p>
+          <a:p>
+            <a:pPr marL="0" indent="0">
+              <a:buNone/>
+            </a:pPr>
+            <a:endParaRPr lang="en-US" dirty="0"/>
+          </a:p>
+          <a:p>
+            <a:pPr marL="0" indent="0">
+              <a:buNone/>
+            </a:pPr>
+            <a:endParaRPr lang="en-GB" dirty="0"/>
           </a:p>
         </p:txBody>
       </p:sp>
     </p:spTree>
     <p:extLst>
       <p:ext uri="{BB962C8B-B14F-4D97-AF65-F5344CB8AC3E}">
-        <p14:creationId xmlns:p14="http://schemas.microsoft.com/office/powerpoint/2010/main" val="1230051214"/>
+        <p14:creationId xmlns:p14="http://schemas.microsoft.com/office/powerpoint/2010/main" val="782054948"/>
       </p:ext>
     </p:extLst>
   </p:cSld>
@@ -4163,7 +4145,7 @@
           <p:cNvPr id="2" name="Title 1">
             <a:extLst>
               <a:ext uri="{FF2B5EF4-FFF2-40B4-BE49-F238E27FC236}">
-                <a16:creationId xmlns:a16="http://schemas.microsoft.com/office/drawing/2014/main" id="{FB2201D0-BA7A-0EF0-58EB-4A8DC6CA878D}"/>
+                <a16:creationId xmlns:a16="http://schemas.microsoft.com/office/drawing/2014/main" id="{37C46591-94B5-B68F-F07C-30A46AF097CE}"/>
               </a:ext>
             </a:extLst>
           </p:cNvPr>
@@ -4176,14 +4158,16 @@
         </p:nvSpPr>
         <p:spPr/>
         <p:txBody>
-          <a:bodyPr/>
-          <a:lstStyle/>
-          <a:p>
-            <a:r>
-              <a:rPr lang="en-US" dirty="0"/>
-              <a:t>Objective Function</a:t>
-            </a:r>
-            <a:endParaRPr lang="en-GB" dirty="0"/>
+          <a:bodyPr>
+            <a:normAutofit/>
+          </a:bodyPr>
+          <a:lstStyle/>
+          <a:p>
+            <a:r>
+              <a:rPr lang="en-US" sz="4000" dirty="0"/>
+              <a:t>Bayesian Adaptive Direct Search (BADS) Optimizer</a:t>
+            </a:r>
+            <a:endParaRPr lang="en-GB" sz="4000" dirty="0"/>
           </a:p>
         </p:txBody>
       </p:sp>
@@ -4192,7 +4176,7 @@
           <p:cNvPr id="3" name="Content Placeholder 2">
             <a:extLst>
               <a:ext uri="{FF2B5EF4-FFF2-40B4-BE49-F238E27FC236}">
-                <a16:creationId xmlns:a16="http://schemas.microsoft.com/office/drawing/2014/main" id="{02B0CB84-4A0E-1A06-7EB1-991F0C39E4BF}"/>
+                <a16:creationId xmlns:a16="http://schemas.microsoft.com/office/drawing/2014/main" id="{D6D84666-3F83-D115-7883-951F3E3B390D}"/>
               </a:ext>
             </a:extLst>
           </p:cNvPr>
@@ -4203,117 +4187,52 @@
             <p:ph idx="1"/>
           </p:nvPr>
         </p:nvSpPr>
-        <p:spPr>
-          <a:xfrm>
-            <a:off x="838200" y="1825625"/>
-            <a:ext cx="10515600" cy="2352092"/>
-          </a:xfrm>
-        </p:spPr>
-        <p:txBody>
-          <a:bodyPr/>
-          <a:lstStyle/>
-          <a:p>
-            <a:r>
-              <a:rPr lang="en-US" dirty="0"/>
-              <a:t>The function we want our optimizer to minimize.</a:t>
-            </a:r>
-          </a:p>
-          <a:p>
-            <a:r>
-              <a:rPr lang="en-US" dirty="0"/>
-              <a:t>We usually want to minimize cost/loss functions and maximize likelihood functions.</a:t>
-            </a:r>
-          </a:p>
-          <a:p>
-            <a:r>
-              <a:rPr lang="en-US" dirty="0"/>
-              <a:t>Here we used a log-likelihood function but since BADS is a minimizing optimizer we used the negative log-likelihood function.</a:t>
-            </a:r>
-          </a:p>
-          <a:p>
-            <a:pPr marL="0" indent="0">
-              <a:buNone/>
-            </a:pPr>
-            <a:endParaRPr lang="en-US" dirty="0"/>
-          </a:p>
-          <a:p>
-            <a:endParaRPr lang="en-GB" dirty="0"/>
-          </a:p>
-        </p:txBody>
-      </p:sp>
-      <p:pic>
-        <p:nvPicPr>
-          <p:cNvPr id="6" name="Picture 5">
-            <a:extLst>
-              <a:ext uri="{FF2B5EF4-FFF2-40B4-BE49-F238E27FC236}">
-                <a16:creationId xmlns:a16="http://schemas.microsoft.com/office/drawing/2014/main" id="{BB342F72-F5B1-4CB6-E59F-D52CD746BA06}"/>
-              </a:ext>
-            </a:extLst>
-          </p:cNvPr>
-          <p:cNvPicPr>
-            <a:picLocks noChangeAspect="1"/>
-          </p:cNvPicPr>
-          <p:nvPr/>
-        </p:nvPicPr>
-        <p:blipFill>
-          <a:blip r:embed="rId2"/>
-          <a:stretch>
-            <a:fillRect/>
-          </a:stretch>
-        </p:blipFill>
-        <p:spPr>
-          <a:xfrm>
-            <a:off x="871667" y="4045766"/>
-            <a:ext cx="10274461" cy="876300"/>
-          </a:xfrm>
-          <a:prstGeom prst="rect">
-            <a:avLst/>
-          </a:prstGeom>
-        </p:spPr>
-      </p:pic>
-      <p:sp>
-        <p:nvSpPr>
-          <p:cNvPr id="9" name="TextBox 8">
-            <a:extLst>
-              <a:ext uri="{FF2B5EF4-FFF2-40B4-BE49-F238E27FC236}">
-                <a16:creationId xmlns:a16="http://schemas.microsoft.com/office/drawing/2014/main" id="{BA8107CC-42DC-80A4-A4D0-60FF34C58ABD}"/>
-              </a:ext>
-            </a:extLst>
-          </p:cNvPr>
-          <p:cNvSpPr txBox="1"/>
-          <p:nvPr/>
-        </p:nvSpPr>
-        <p:spPr>
-          <a:xfrm>
-            <a:off x="1045872" y="4790114"/>
-            <a:ext cx="10066789" cy="1815882"/>
-          </a:xfrm>
-          <a:prstGeom prst="rect">
-            <a:avLst/>
-          </a:prstGeom>
-          <a:noFill/>
-        </p:spPr>
-        <p:txBody>
-          <a:bodyPr wrap="square" rtlCol="0">
-            <a:spAutoFit/>
+        <p:spPr/>
+        <p:txBody>
+          <a:bodyPr>
+            <a:normAutofit lnSpcReduction="10000"/>
           </a:bodyPr>
           <a:lstStyle/>
           <a:p>
             <a:r>
-              <a:rPr lang="en-US" sz="2800" dirty="0"/>
-              <a:t>y = answer (1 or 0)</a:t>
-            </a:r>
-          </a:p>
-          <a:p>
-            <a:r>
-              <a:rPr lang="en-US" sz="2800" dirty="0"/>
-              <a:t>y^ = model prediction (0-1)</a:t>
-            </a:r>
-          </a:p>
-          <a:p>
-            <a:r>
-              <a:rPr lang="en-US" sz="2800" dirty="0"/>
-              <a:t>The closer the model prediction is to the answer the bigger the likelihood, therefore, the higher the negative likelihood.</a:t>
+              <a:rPr lang="en-US" dirty="0"/>
+              <a:t>x0 = [0.5 0.5 0.5 0.5]  	% Starting points (multiple starting points 					% were used to avoid local minimums)</a:t>
+            </a:r>
+          </a:p>
+          <a:p>
+            <a:r>
+              <a:rPr lang="en-US" dirty="0"/>
+              <a:t>lb = [0 0 0 0]		% Lower bounds</a:t>
+            </a:r>
+          </a:p>
+          <a:p>
+            <a:r>
+              <a:rPr lang="en-US" dirty="0"/>
+              <a:t>ub = [1 1 1 1]		% Upper bounds</a:t>
+            </a:r>
+          </a:p>
+          <a:p>
+            <a:r>
+              <a:rPr lang="en-US" dirty="0"/>
+              <a:t>plb = [0.5 0.3 0.1 0]	% Plausible lower bounds (was not used due 				% to high variance between subjects)</a:t>
+            </a:r>
+          </a:p>
+          <a:p>
+            <a:r>
+              <a:rPr lang="en-GB" dirty="0"/>
+              <a:t>pub = [1 0.9 0.7 0.6]	% Plausible upper bounds (was not used due 				% to high variance between subjects)</a:t>
+            </a:r>
+          </a:p>
+          <a:p>
+            <a:r>
+              <a:rPr lang="en-GB" dirty="0"/>
+              <a:t>nonbcon = @nonbcon 	% Non-bound constraint function</a:t>
+            </a:r>
+          </a:p>
+          <a:p>
+            <a:r>
+              <a:rPr lang="en-GB" dirty="0"/>
+              <a:t>bads(objective_function, x0, lb, ub, plb, pub, nonbcon)</a:t>
             </a:r>
           </a:p>
         </p:txBody>
@@ -4321,7 +4240,7 @@
     </p:spTree>
     <p:extLst>
       <p:ext uri="{BB962C8B-B14F-4D97-AF65-F5344CB8AC3E}">
-        <p14:creationId xmlns:p14="http://schemas.microsoft.com/office/powerpoint/2010/main" val="3820433868"/>
+        <p14:creationId xmlns:p14="http://schemas.microsoft.com/office/powerpoint/2010/main" val="1230051214"/>
       </p:ext>
     </p:extLst>
   </p:cSld>
@@ -4353,6 +4272,196 @@
           <p:cNvPr id="2" name="Title 1">
             <a:extLst>
               <a:ext uri="{FF2B5EF4-FFF2-40B4-BE49-F238E27FC236}">
+                <a16:creationId xmlns:a16="http://schemas.microsoft.com/office/drawing/2014/main" id="{FB2201D0-BA7A-0EF0-58EB-4A8DC6CA878D}"/>
+              </a:ext>
+            </a:extLst>
+          </p:cNvPr>
+          <p:cNvSpPr>
+            <a:spLocks noGrp="1"/>
+          </p:cNvSpPr>
+          <p:nvPr>
+            <p:ph type="title"/>
+          </p:nvPr>
+        </p:nvSpPr>
+        <p:spPr/>
+        <p:txBody>
+          <a:bodyPr/>
+          <a:lstStyle/>
+          <a:p>
+            <a:r>
+              <a:rPr lang="en-US" dirty="0"/>
+              <a:t>Objective Function</a:t>
+            </a:r>
+            <a:endParaRPr lang="en-GB" dirty="0"/>
+          </a:p>
+        </p:txBody>
+      </p:sp>
+      <p:sp>
+        <p:nvSpPr>
+          <p:cNvPr id="3" name="Content Placeholder 2">
+            <a:extLst>
+              <a:ext uri="{FF2B5EF4-FFF2-40B4-BE49-F238E27FC236}">
+                <a16:creationId xmlns:a16="http://schemas.microsoft.com/office/drawing/2014/main" id="{02B0CB84-4A0E-1A06-7EB1-991F0C39E4BF}"/>
+              </a:ext>
+            </a:extLst>
+          </p:cNvPr>
+          <p:cNvSpPr>
+            <a:spLocks noGrp="1"/>
+          </p:cNvSpPr>
+          <p:nvPr>
+            <p:ph idx="1"/>
+          </p:nvPr>
+        </p:nvSpPr>
+        <p:spPr>
+          <a:xfrm>
+            <a:off x="838200" y="1825625"/>
+            <a:ext cx="10515600" cy="2352092"/>
+          </a:xfrm>
+        </p:spPr>
+        <p:txBody>
+          <a:bodyPr/>
+          <a:lstStyle/>
+          <a:p>
+            <a:r>
+              <a:rPr lang="en-US" dirty="0"/>
+              <a:t>The function we want our optimizer to minimize.</a:t>
+            </a:r>
+          </a:p>
+          <a:p>
+            <a:r>
+              <a:rPr lang="en-US" dirty="0"/>
+              <a:t>We usually want to minimize cost/loss functions and maximize likelihood functions.</a:t>
+            </a:r>
+          </a:p>
+          <a:p>
+            <a:r>
+              <a:rPr lang="en-US" dirty="0"/>
+              <a:t>Here we used a log-likelihood function but since BADS is a minimizing optimizer we used the negative log-likelihood function.</a:t>
+            </a:r>
+          </a:p>
+          <a:p>
+            <a:pPr marL="0" indent="0">
+              <a:buNone/>
+            </a:pPr>
+            <a:endParaRPr lang="en-US" dirty="0"/>
+          </a:p>
+          <a:p>
+            <a:endParaRPr lang="en-GB" dirty="0"/>
+          </a:p>
+        </p:txBody>
+      </p:sp>
+      <p:pic>
+        <p:nvPicPr>
+          <p:cNvPr id="6" name="Picture 5">
+            <a:extLst>
+              <a:ext uri="{FF2B5EF4-FFF2-40B4-BE49-F238E27FC236}">
+                <a16:creationId xmlns:a16="http://schemas.microsoft.com/office/drawing/2014/main" id="{BB342F72-F5B1-4CB6-E59F-D52CD746BA06}"/>
+              </a:ext>
+            </a:extLst>
+          </p:cNvPr>
+          <p:cNvPicPr>
+            <a:picLocks noChangeAspect="1"/>
+          </p:cNvPicPr>
+          <p:nvPr/>
+        </p:nvPicPr>
+        <p:blipFill>
+          <a:blip r:embed="rId2"/>
+          <a:stretch>
+            <a:fillRect/>
+          </a:stretch>
+        </p:blipFill>
+        <p:spPr>
+          <a:xfrm>
+            <a:off x="871667" y="4045766"/>
+            <a:ext cx="10274461" cy="876300"/>
+          </a:xfrm>
+          <a:prstGeom prst="rect">
+            <a:avLst/>
+          </a:prstGeom>
+        </p:spPr>
+      </p:pic>
+      <p:sp>
+        <p:nvSpPr>
+          <p:cNvPr id="9" name="TextBox 8">
+            <a:extLst>
+              <a:ext uri="{FF2B5EF4-FFF2-40B4-BE49-F238E27FC236}">
+                <a16:creationId xmlns:a16="http://schemas.microsoft.com/office/drawing/2014/main" id="{BA8107CC-42DC-80A4-A4D0-60FF34C58ABD}"/>
+              </a:ext>
+            </a:extLst>
+          </p:cNvPr>
+          <p:cNvSpPr txBox="1"/>
+          <p:nvPr/>
+        </p:nvSpPr>
+        <p:spPr>
+          <a:xfrm>
+            <a:off x="1045872" y="4790114"/>
+            <a:ext cx="10066789" cy="1815882"/>
+          </a:xfrm>
+          <a:prstGeom prst="rect">
+            <a:avLst/>
+          </a:prstGeom>
+          <a:noFill/>
+        </p:spPr>
+        <p:txBody>
+          <a:bodyPr wrap="square" rtlCol="0">
+            <a:spAutoFit/>
+          </a:bodyPr>
+          <a:lstStyle/>
+          <a:p>
+            <a:r>
+              <a:rPr lang="en-US" sz="2800" dirty="0"/>
+              <a:t>y = answer (1 or 0)</a:t>
+            </a:r>
+          </a:p>
+          <a:p>
+            <a:r>
+              <a:rPr lang="en-US" sz="2800" dirty="0"/>
+              <a:t>y^ = model prediction (0-1)</a:t>
+            </a:r>
+          </a:p>
+          <a:p>
+            <a:r>
+              <a:rPr lang="en-US" sz="2800" dirty="0"/>
+              <a:t>The closer the model prediction is to the answer the bigger the likelihood, therefore, the higher the negative likelihood.</a:t>
+            </a:r>
+          </a:p>
+        </p:txBody>
+      </p:sp>
+    </p:spTree>
+    <p:extLst>
+      <p:ext uri="{BB962C8B-B14F-4D97-AF65-F5344CB8AC3E}">
+        <p14:creationId xmlns:p14="http://schemas.microsoft.com/office/powerpoint/2010/main" val="3820433868"/>
+      </p:ext>
+    </p:extLst>
+  </p:cSld>
+  <p:clrMapOvr>
+    <a:masterClrMapping/>
+  </p:clrMapOvr>
+</p:sld>
+</file>
+
+<file path=ppt/slides/slide16.xml><?xml version="1.0" encoding="utf-8"?>
+<p:sld xmlns:a="http://schemas.openxmlformats.org/drawingml/2006/main" xmlns:r="http://schemas.openxmlformats.org/officeDocument/2006/relationships" xmlns:p="http://schemas.openxmlformats.org/presentationml/2006/main">
+  <p:cSld>
+    <p:spTree>
+      <p:nvGrpSpPr>
+        <p:cNvPr id="1" name=""/>
+        <p:cNvGrpSpPr/>
+        <p:nvPr/>
+      </p:nvGrpSpPr>
+      <p:grpSpPr>
+        <a:xfrm>
+          <a:off x="0" y="0"/>
+          <a:ext cx="0" cy="0"/>
+          <a:chOff x="0" y="0"/>
+          <a:chExt cx="0" cy="0"/>
+        </a:xfrm>
+      </p:grpSpPr>
+      <p:sp>
+        <p:nvSpPr>
+          <p:cNvPr id="2" name="Title 1">
+            <a:extLst>
+              <a:ext uri="{FF2B5EF4-FFF2-40B4-BE49-F238E27FC236}">
                 <a16:creationId xmlns:a16="http://schemas.microsoft.com/office/drawing/2014/main" id="{86B7312C-52D8-94B7-9773-7EDEFAB96ED2}"/>
               </a:ext>
             </a:extLst>
@@ -4455,6 +4564,26 @@
               <a:rPr lang="en-US" dirty="0"/>
               <a:t>Since ln(n) is greater than 2 if n &gt;= 8, the difference between the two is that BIC punishes a higher number of parameters more than AIC.</a:t>
             </a:r>
+          </a:p>
+          <a:p>
+            <a:r>
+              <a:rPr lang="en-US" dirty="0"/>
+              <a:t>“</a:t>
+            </a:r>
+            <a:r>
+              <a:rPr lang="en-GB" b="0" i="0" dirty="0">
+                <a:solidFill>
+                  <a:srgbClr val="222222"/>
+                </a:solidFill>
+                <a:effectLst/>
+                <a:latin typeface="-apple-system"/>
+              </a:rPr>
+              <a:t>ΔBIC magnitudes between 2 and 6, between 6 and 10 and &gt; 10 are considered positive, strong and very strong evidence (respectively) for the model with the lower BIC value” (Feigin &amp; Baror, 2021).</a:t>
+            </a:r>
+            <a:endParaRPr lang="en-GB" dirty="0"/>
+          </a:p>
+          <a:p>
+            <a:endParaRPr lang="en-US" dirty="0"/>
           </a:p>
         </p:txBody>
       </p:sp>
@@ -4605,7 +4734,7 @@
 </p:sld>
 </file>
 
-<file path=ppt/slides/slide16.xml><?xml version="1.0" encoding="utf-8"?>
+<file path=ppt/slides/slide17.xml><?xml version="1.0" encoding="utf-8"?>
 <p:sld xmlns:a="http://schemas.openxmlformats.org/drawingml/2006/main" xmlns:r="http://schemas.openxmlformats.org/officeDocument/2006/relationships" xmlns:p="http://schemas.openxmlformats.org/presentationml/2006/main">
   <p:cSld>
     <p:spTree>
@@ -4638,98 +4767,187 @@
             <p:ph type="title"/>
           </p:nvPr>
         </p:nvSpPr>
-        <p:spPr/>
-        <p:txBody>
-          <a:bodyPr/>
-          <a:lstStyle/>
-          <a:p>
-            <a:r>
-              <a:rPr lang="en-US" dirty="0"/>
-              <a:t>ALL THE COMPARISON!!! @! @#! @#!</a:t>
+        <p:spPr>
+          <a:xfrm>
+            <a:off x="165370" y="365125"/>
+            <a:ext cx="3657600" cy="5996764"/>
+          </a:xfrm>
+        </p:spPr>
+        <p:txBody>
+          <a:bodyPr>
+            <a:normAutofit/>
+          </a:bodyPr>
+          <a:lstStyle/>
+          <a:p>
+            <a:r>
+              <a:rPr lang="en-US" dirty="0"/>
+              <a:t>Multiplicative </a:t>
+            </a:r>
+            <a:br>
+              <a:rPr lang="en-US" dirty="0"/>
+            </a:br>
+            <a:r>
+              <a:rPr lang="en-US" dirty="0"/>
+              <a:t>Vs.</a:t>
+            </a:r>
+            <a:br>
+              <a:rPr lang="en-US" dirty="0"/>
+            </a:br>
+            <a:r>
+              <a:rPr lang="en-US" dirty="0"/>
+              <a:t>Multiplicative with constraint</a:t>
             </a:r>
             <a:endParaRPr lang="en-GB" dirty="0"/>
           </a:p>
         </p:txBody>
       </p:sp>
-      <p:sp>
-        <p:nvSpPr>
-          <p:cNvPr id="3" name="Content Placeholder 2">
-            <a:extLst>
-              <a:ext uri="{FF2B5EF4-FFF2-40B4-BE49-F238E27FC236}">
-                <a16:creationId xmlns:a16="http://schemas.microsoft.com/office/drawing/2014/main" id="{9D6CEF9D-A67D-B345-123A-39EA7C3424A9}"/>
-              </a:ext>
-            </a:extLst>
-          </p:cNvPr>
-          <p:cNvSpPr>
-            <a:spLocks noGrp="1"/>
-          </p:cNvSpPr>
-          <p:nvPr>
-            <p:ph idx="1"/>
-          </p:nvPr>
-        </p:nvSpPr>
-        <p:spPr/>
-        <p:txBody>
-          <a:bodyPr/>
-          <a:lstStyle/>
-          <a:p>
-            <a:r>
-              <a:rPr lang="en-US" dirty="0"/>
-              <a:t>“</a:t>
-            </a:r>
-            <a:r>
-              <a:rPr lang="en-GB" b="0" i="0" dirty="0">
-                <a:solidFill>
-                  <a:srgbClr val="222222"/>
-                </a:solidFill>
-                <a:effectLst/>
-                <a:latin typeface="-apple-system"/>
-              </a:rPr>
-              <a:t>ΔBIC magnitudes between 2 and 6, between 6 and 10 and &gt; 10 are considered positive, strong and very strong evidence (respectively) for the model with the lower BIC value” (</a:t>
-            </a:r>
-            <a:r>
-              <a:rPr lang="en-GB" b="0" i="0" dirty="0" err="1">
-                <a:solidFill>
-                  <a:srgbClr val="222222"/>
-                </a:solidFill>
-                <a:effectLst/>
-                <a:latin typeface="-apple-system"/>
-              </a:rPr>
-              <a:t>Feigin</a:t>
-            </a:r>
-            <a:r>
-              <a:rPr lang="en-GB" b="0" i="0" dirty="0">
-                <a:solidFill>
-                  <a:srgbClr val="222222"/>
-                </a:solidFill>
-                <a:effectLst/>
-                <a:latin typeface="-apple-system"/>
-              </a:rPr>
-              <a:t> &amp; </a:t>
-            </a:r>
-            <a:r>
-              <a:rPr lang="en-GB" b="0" i="0" dirty="0" err="1">
-                <a:solidFill>
-                  <a:srgbClr val="222222"/>
-                </a:solidFill>
-                <a:effectLst/>
-                <a:latin typeface="-apple-system"/>
-              </a:rPr>
-              <a:t>Baror</a:t>
-            </a:r>
-            <a:r>
-              <a:rPr lang="en-GB" b="0" i="0" dirty="0">
-                <a:solidFill>
-                  <a:srgbClr val="222222"/>
-                </a:solidFill>
-                <a:effectLst/>
-                <a:latin typeface="-apple-system"/>
-              </a:rPr>
-              <a:t>, 2021).</a:t>
+      <p:pic>
+        <p:nvPicPr>
+          <p:cNvPr id="4" name="Picture 3">
+            <a:extLst>
+              <a:ext uri="{FF2B5EF4-FFF2-40B4-BE49-F238E27FC236}">
+                <a16:creationId xmlns:a16="http://schemas.microsoft.com/office/drawing/2014/main" id="{B9EBA940-1A2E-0EB6-C87C-53A27E42A9B6}"/>
+              </a:ext>
+            </a:extLst>
+          </p:cNvPr>
+          <p:cNvPicPr>
+            <a:picLocks noChangeAspect="1"/>
+          </p:cNvPicPr>
+          <p:nvPr/>
+        </p:nvPicPr>
+        <p:blipFill>
+          <a:blip r:embed="rId2"/>
+          <a:stretch>
+            <a:fillRect/>
+          </a:stretch>
+        </p:blipFill>
+        <p:spPr>
+          <a:xfrm>
+            <a:off x="4352925" y="177800"/>
+            <a:ext cx="7839075" cy="6315075"/>
+          </a:xfrm>
+          <a:prstGeom prst="rect">
+            <a:avLst/>
+          </a:prstGeom>
+        </p:spPr>
+      </p:pic>
+    </p:spTree>
+    <p:extLst>
+      <p:ext uri="{BB962C8B-B14F-4D97-AF65-F5344CB8AC3E}">
+        <p14:creationId xmlns:p14="http://schemas.microsoft.com/office/powerpoint/2010/main" val="872621337"/>
+      </p:ext>
+    </p:extLst>
+  </p:cSld>
+  <p:clrMapOvr>
+    <a:masterClrMapping/>
+  </p:clrMapOvr>
+</p:sld>
+</file>
+
+<file path=ppt/slides/slide18.xml><?xml version="1.0" encoding="utf-8"?>
+<p:sld xmlns:a="http://schemas.openxmlformats.org/drawingml/2006/main" xmlns:r="http://schemas.openxmlformats.org/officeDocument/2006/relationships" xmlns:p="http://schemas.openxmlformats.org/presentationml/2006/main">
+  <p:cSld>
+    <p:spTree>
+      <p:nvGrpSpPr>
+        <p:cNvPr id="1" name=""/>
+        <p:cNvGrpSpPr/>
+        <p:nvPr/>
+      </p:nvGrpSpPr>
+      <p:grpSpPr>
+        <a:xfrm>
+          <a:off x="0" y="0"/>
+          <a:ext cx="0" cy="0"/>
+          <a:chOff x="0" y="0"/>
+          <a:chExt cx="0" cy="0"/>
+        </a:xfrm>
+      </p:grpSpPr>
+      <p:sp>
+        <p:nvSpPr>
+          <p:cNvPr id="2" name="Title 1">
+            <a:extLst>
+              <a:ext uri="{FF2B5EF4-FFF2-40B4-BE49-F238E27FC236}">
+                <a16:creationId xmlns:a16="http://schemas.microsoft.com/office/drawing/2014/main" id="{3A532D5F-4C6F-EC2C-6A90-BDA637AE8089}"/>
+              </a:ext>
+            </a:extLst>
+          </p:cNvPr>
+          <p:cNvSpPr>
+            <a:spLocks noGrp="1"/>
+          </p:cNvSpPr>
+          <p:nvPr>
+            <p:ph type="title"/>
+          </p:nvPr>
+        </p:nvSpPr>
+        <p:spPr>
+          <a:xfrm>
+            <a:off x="165370" y="365125"/>
+            <a:ext cx="3844568" cy="5996764"/>
+          </a:xfrm>
+        </p:spPr>
+        <p:txBody>
+          <a:bodyPr>
+            <a:normAutofit/>
+          </a:bodyPr>
+          <a:lstStyle/>
+          <a:p>
+            <a:r>
+              <a:rPr lang="en-US" dirty="0"/>
+              <a:t>Multiplicative</a:t>
+            </a:r>
+            <a:br>
+              <a:rPr lang="en-US" dirty="0"/>
+            </a:br>
+            <a:r>
+              <a:rPr lang="en-US" dirty="0"/>
+              <a:t>With constraint </a:t>
+            </a:r>
+            <a:br>
+              <a:rPr lang="en-US" dirty="0"/>
+            </a:br>
+            <a:r>
+              <a:rPr lang="en-US" dirty="0"/>
+              <a:t>Vs.</a:t>
+            </a:r>
+            <a:br>
+              <a:rPr lang="en-US" dirty="0"/>
+            </a:br>
+            <a:r>
+              <a:rPr lang="en-US" dirty="0"/>
+              <a:t>Null</a:t>
             </a:r>
             <a:endParaRPr lang="en-GB" dirty="0"/>
           </a:p>
         </p:txBody>
       </p:sp>
+      <p:pic>
+        <p:nvPicPr>
+          <p:cNvPr id="4" name="Picture 3">
+            <a:extLst>
+              <a:ext uri="{FF2B5EF4-FFF2-40B4-BE49-F238E27FC236}">
+                <a16:creationId xmlns:a16="http://schemas.microsoft.com/office/drawing/2014/main" id="{064A91F9-1FF7-AD7B-BA68-C367EB79D4F0}"/>
+              </a:ext>
+            </a:extLst>
+          </p:cNvPr>
+          <p:cNvPicPr>
+            <a:picLocks noChangeAspect="1"/>
+          </p:cNvPicPr>
+          <p:nvPr/>
+        </p:nvPicPr>
+        <p:blipFill>
+          <a:blip r:embed="rId2"/>
+          <a:stretch>
+            <a:fillRect/>
+          </a:stretch>
+        </p:blipFill>
+        <p:spPr>
+          <a:xfrm>
+            <a:off x="4092305" y="200025"/>
+            <a:ext cx="7934325" cy="6457950"/>
+          </a:xfrm>
+          <a:prstGeom prst="rect">
+            <a:avLst/>
+          </a:prstGeom>
+        </p:spPr>
+      </p:pic>
     </p:spTree>
     <p:extLst>
       <p:ext uri="{BB962C8B-B14F-4D97-AF65-F5344CB8AC3E}">
@@ -4743,7 +4961,865 @@
 </p:sld>
 </file>
 
+<file path=ppt/slides/slide19.xml><?xml version="1.0" encoding="utf-8"?>
+<p:sld xmlns:a="http://schemas.openxmlformats.org/drawingml/2006/main" xmlns:r="http://schemas.openxmlformats.org/officeDocument/2006/relationships" xmlns:p="http://schemas.openxmlformats.org/presentationml/2006/main">
+  <p:cSld>
+    <p:spTree>
+      <p:nvGrpSpPr>
+        <p:cNvPr id="1" name=""/>
+        <p:cNvGrpSpPr/>
+        <p:nvPr/>
+      </p:nvGrpSpPr>
+      <p:grpSpPr>
+        <a:xfrm>
+          <a:off x="0" y="0"/>
+          <a:ext cx="0" cy="0"/>
+          <a:chOff x="0" y="0"/>
+          <a:chExt cx="0" cy="0"/>
+        </a:xfrm>
+      </p:grpSpPr>
+      <p:sp>
+        <p:nvSpPr>
+          <p:cNvPr id="2" name="Title 1">
+            <a:extLst>
+              <a:ext uri="{FF2B5EF4-FFF2-40B4-BE49-F238E27FC236}">
+                <a16:creationId xmlns:a16="http://schemas.microsoft.com/office/drawing/2014/main" id="{3A532D5F-4C6F-EC2C-6A90-BDA637AE8089}"/>
+              </a:ext>
+            </a:extLst>
+          </p:cNvPr>
+          <p:cNvSpPr>
+            <a:spLocks noGrp="1"/>
+          </p:cNvSpPr>
+          <p:nvPr>
+            <p:ph type="title"/>
+          </p:nvPr>
+        </p:nvSpPr>
+        <p:spPr>
+          <a:xfrm>
+            <a:off x="165370" y="365125"/>
+            <a:ext cx="3657600" cy="5996764"/>
+          </a:xfrm>
+        </p:spPr>
+        <p:txBody>
+          <a:bodyPr>
+            <a:normAutofit/>
+          </a:bodyPr>
+          <a:lstStyle/>
+          <a:p>
+            <a:r>
+              <a:rPr lang="en-US" dirty="0"/>
+              <a:t>Multiplicative </a:t>
+            </a:r>
+            <a:br>
+              <a:rPr lang="en-US" dirty="0"/>
+            </a:br>
+            <a:r>
+              <a:rPr lang="en-US" dirty="0"/>
+              <a:t>with constraint</a:t>
+            </a:r>
+            <a:br>
+              <a:rPr lang="en-US" dirty="0"/>
+            </a:br>
+            <a:r>
+              <a:rPr lang="en-US" dirty="0"/>
+              <a:t>Vs.</a:t>
+            </a:r>
+            <a:br>
+              <a:rPr lang="en-US" dirty="0"/>
+            </a:br>
+            <a:r>
+              <a:rPr lang="en-US" dirty="0"/>
+              <a:t>Minimum </a:t>
+            </a:r>
+            <a:br>
+              <a:rPr lang="en-US" dirty="0"/>
+            </a:br>
+            <a:r>
+              <a:rPr lang="en-US" dirty="0"/>
+              <a:t>with constraint</a:t>
+            </a:r>
+            <a:endParaRPr lang="en-GB" dirty="0"/>
+          </a:p>
+        </p:txBody>
+      </p:sp>
+      <p:pic>
+        <p:nvPicPr>
+          <p:cNvPr id="5" name="Picture 4">
+            <a:extLst>
+              <a:ext uri="{FF2B5EF4-FFF2-40B4-BE49-F238E27FC236}">
+                <a16:creationId xmlns:a16="http://schemas.microsoft.com/office/drawing/2014/main" id="{655ED686-E7EF-310D-9EF7-BAB85DF62A06}"/>
+              </a:ext>
+            </a:extLst>
+          </p:cNvPr>
+          <p:cNvPicPr>
+            <a:picLocks noChangeAspect="1"/>
+          </p:cNvPicPr>
+          <p:nvPr/>
+        </p:nvPicPr>
+        <p:blipFill>
+          <a:blip r:embed="rId2"/>
+          <a:stretch>
+            <a:fillRect/>
+          </a:stretch>
+        </p:blipFill>
+        <p:spPr>
+          <a:xfrm>
+            <a:off x="4333875" y="309562"/>
+            <a:ext cx="7858125" cy="6238875"/>
+          </a:xfrm>
+          <a:prstGeom prst="rect">
+            <a:avLst/>
+          </a:prstGeom>
+        </p:spPr>
+      </p:pic>
+    </p:spTree>
+    <p:extLst>
+      <p:ext uri="{BB962C8B-B14F-4D97-AF65-F5344CB8AC3E}">
+        <p14:creationId xmlns:p14="http://schemas.microsoft.com/office/powerpoint/2010/main" val="4253475455"/>
+      </p:ext>
+    </p:extLst>
+  </p:cSld>
+  <p:clrMapOvr>
+    <a:masterClrMapping/>
+  </p:clrMapOvr>
+</p:sld>
+</file>
+
 <file path=ppt/slides/slide2.xml><?xml version="1.0" encoding="utf-8"?>
+<p:sld xmlns:a="http://schemas.openxmlformats.org/drawingml/2006/main" xmlns:r="http://schemas.openxmlformats.org/officeDocument/2006/relationships" xmlns:p="http://schemas.openxmlformats.org/presentationml/2006/main">
+  <p:cSld>
+    <p:spTree>
+      <p:nvGrpSpPr>
+        <p:cNvPr id="1" name=""/>
+        <p:cNvGrpSpPr/>
+        <p:nvPr/>
+      </p:nvGrpSpPr>
+      <p:grpSpPr>
+        <a:xfrm>
+          <a:off x="0" y="0"/>
+          <a:ext cx="0" cy="0"/>
+          <a:chOff x="0" y="0"/>
+          <a:chExt cx="0" cy="0"/>
+        </a:xfrm>
+      </p:grpSpPr>
+      <p:sp>
+        <p:nvSpPr>
+          <p:cNvPr id="2" name="Title 1">
+            <a:extLst>
+              <a:ext uri="{FF2B5EF4-FFF2-40B4-BE49-F238E27FC236}">
+                <a16:creationId xmlns:a16="http://schemas.microsoft.com/office/drawing/2014/main" id="{CCDBC4EB-5506-ECF9-4087-C98AC5BFD2BD}"/>
+              </a:ext>
+            </a:extLst>
+          </p:cNvPr>
+          <p:cNvSpPr>
+            <a:spLocks noGrp="1"/>
+          </p:cNvSpPr>
+          <p:nvPr>
+            <p:ph type="title"/>
+          </p:nvPr>
+        </p:nvSpPr>
+        <p:spPr/>
+        <p:txBody>
+          <a:bodyPr/>
+          <a:lstStyle/>
+          <a:p>
+            <a:r>
+              <a:rPr lang="en-US" dirty="0"/>
+              <a:t>T1 Vs. T1S1 Distinction</a:t>
+            </a:r>
+            <a:endParaRPr lang="en-GB" dirty="0"/>
+          </a:p>
+        </p:txBody>
+      </p:sp>
+      <p:pic>
+        <p:nvPicPr>
+          <p:cNvPr id="7" name="Picture 6">
+            <a:extLst>
+              <a:ext uri="{FF2B5EF4-FFF2-40B4-BE49-F238E27FC236}">
+                <a16:creationId xmlns:a16="http://schemas.microsoft.com/office/drawing/2014/main" id="{2566BE0E-DE11-A58C-9060-4B25A672BD82}"/>
+              </a:ext>
+            </a:extLst>
+          </p:cNvPr>
+          <p:cNvPicPr>
+            <a:picLocks noChangeAspect="1"/>
+          </p:cNvPicPr>
+          <p:nvPr/>
+        </p:nvPicPr>
+        <p:blipFill>
+          <a:blip r:embed="rId2"/>
+          <a:stretch>
+            <a:fillRect/>
+          </a:stretch>
+        </p:blipFill>
+        <p:spPr>
+          <a:xfrm>
+            <a:off x="838200" y="1825626"/>
+            <a:ext cx="5594481" cy="4310502"/>
+          </a:xfrm>
+          <a:prstGeom prst="rect">
+            <a:avLst/>
+          </a:prstGeom>
+        </p:spPr>
+      </p:pic>
+      <p:pic>
+        <p:nvPicPr>
+          <p:cNvPr id="9" name="Picture 8">
+            <a:extLst>
+              <a:ext uri="{FF2B5EF4-FFF2-40B4-BE49-F238E27FC236}">
+                <a16:creationId xmlns:a16="http://schemas.microsoft.com/office/drawing/2014/main" id="{1D92794A-A2D1-7C51-D31F-72E06EE122CF}"/>
+              </a:ext>
+            </a:extLst>
+          </p:cNvPr>
+          <p:cNvPicPr>
+            <a:picLocks noChangeAspect="1"/>
+          </p:cNvPicPr>
+          <p:nvPr/>
+        </p:nvPicPr>
+        <p:blipFill>
+          <a:blip r:embed="rId3"/>
+          <a:stretch>
+            <a:fillRect/>
+          </a:stretch>
+        </p:blipFill>
+        <p:spPr>
+          <a:xfrm>
+            <a:off x="6331825" y="1825626"/>
+            <a:ext cx="5021975" cy="4351338"/>
+          </a:xfrm>
+          <a:prstGeom prst="rect">
+            <a:avLst/>
+          </a:prstGeom>
+        </p:spPr>
+      </p:pic>
+    </p:spTree>
+    <p:extLst>
+      <p:ext uri="{BB962C8B-B14F-4D97-AF65-F5344CB8AC3E}">
+        <p14:creationId xmlns:p14="http://schemas.microsoft.com/office/powerpoint/2010/main" val="952008394"/>
+      </p:ext>
+    </p:extLst>
+  </p:cSld>
+  <p:clrMapOvr>
+    <a:masterClrMapping/>
+  </p:clrMapOvr>
+</p:sld>
+</file>
+
+<file path=ppt/slides/slide20.xml><?xml version="1.0" encoding="utf-8"?>
+<p:sld xmlns:a="http://schemas.openxmlformats.org/drawingml/2006/main" xmlns:r="http://schemas.openxmlformats.org/officeDocument/2006/relationships" xmlns:p="http://schemas.openxmlformats.org/presentationml/2006/main">
+  <p:cSld>
+    <p:spTree>
+      <p:nvGrpSpPr>
+        <p:cNvPr id="1" name=""/>
+        <p:cNvGrpSpPr/>
+        <p:nvPr/>
+      </p:nvGrpSpPr>
+      <p:grpSpPr>
+        <a:xfrm>
+          <a:off x="0" y="0"/>
+          <a:ext cx="0" cy="0"/>
+          <a:chOff x="0" y="0"/>
+          <a:chExt cx="0" cy="0"/>
+        </a:xfrm>
+      </p:grpSpPr>
+      <p:sp>
+        <p:nvSpPr>
+          <p:cNvPr id="2" name="Title 1">
+            <a:extLst>
+              <a:ext uri="{FF2B5EF4-FFF2-40B4-BE49-F238E27FC236}">
+                <a16:creationId xmlns:a16="http://schemas.microsoft.com/office/drawing/2014/main" id="{3A532D5F-4C6F-EC2C-6A90-BDA637AE8089}"/>
+              </a:ext>
+            </a:extLst>
+          </p:cNvPr>
+          <p:cNvSpPr>
+            <a:spLocks noGrp="1"/>
+          </p:cNvSpPr>
+          <p:nvPr>
+            <p:ph type="title"/>
+          </p:nvPr>
+        </p:nvSpPr>
+        <p:spPr>
+          <a:xfrm>
+            <a:off x="165370" y="365125"/>
+            <a:ext cx="3657600" cy="5996764"/>
+          </a:xfrm>
+        </p:spPr>
+        <p:txBody>
+          <a:bodyPr>
+            <a:normAutofit/>
+          </a:bodyPr>
+          <a:lstStyle/>
+          <a:p>
+            <a:r>
+              <a:rPr lang="en-US" dirty="0"/>
+              <a:t>Multiplicative </a:t>
+            </a:r>
+            <a:br>
+              <a:rPr lang="en-US" dirty="0"/>
+            </a:br>
+            <a:r>
+              <a:rPr lang="en-US" dirty="0"/>
+              <a:t>with constraint</a:t>
+            </a:r>
+            <a:br>
+              <a:rPr lang="en-US" dirty="0"/>
+            </a:br>
+            <a:r>
+              <a:rPr lang="en-US" dirty="0"/>
+              <a:t>Vs.</a:t>
+            </a:r>
+            <a:br>
+              <a:rPr lang="en-US" dirty="0"/>
+            </a:br>
+            <a:r>
+              <a:rPr lang="en-US" dirty="0"/>
+              <a:t>Mean </a:t>
+            </a:r>
+            <a:br>
+              <a:rPr lang="en-US" dirty="0"/>
+            </a:br>
+            <a:r>
+              <a:rPr lang="en-US" dirty="0"/>
+              <a:t>with constraint</a:t>
+            </a:r>
+            <a:endParaRPr lang="en-GB" dirty="0"/>
+          </a:p>
+        </p:txBody>
+      </p:sp>
+      <p:pic>
+        <p:nvPicPr>
+          <p:cNvPr id="4" name="Picture 3">
+            <a:extLst>
+              <a:ext uri="{FF2B5EF4-FFF2-40B4-BE49-F238E27FC236}">
+                <a16:creationId xmlns:a16="http://schemas.microsoft.com/office/drawing/2014/main" id="{62BAE318-7128-0F55-472A-8C5265C2825B}"/>
+              </a:ext>
+            </a:extLst>
+          </p:cNvPr>
+          <p:cNvPicPr>
+            <a:picLocks noChangeAspect="1"/>
+          </p:cNvPicPr>
+          <p:nvPr/>
+        </p:nvPicPr>
+        <p:blipFill>
+          <a:blip r:embed="rId2"/>
+          <a:stretch>
+            <a:fillRect/>
+          </a:stretch>
+        </p:blipFill>
+        <p:spPr>
+          <a:xfrm>
+            <a:off x="4248150" y="272644"/>
+            <a:ext cx="7943850" cy="6181725"/>
+          </a:xfrm>
+          <a:prstGeom prst="rect">
+            <a:avLst/>
+          </a:prstGeom>
+        </p:spPr>
+      </p:pic>
+    </p:spTree>
+    <p:extLst>
+      <p:ext uri="{BB962C8B-B14F-4D97-AF65-F5344CB8AC3E}">
+        <p14:creationId xmlns:p14="http://schemas.microsoft.com/office/powerpoint/2010/main" val="162005955"/>
+      </p:ext>
+    </p:extLst>
+  </p:cSld>
+  <p:clrMapOvr>
+    <a:masterClrMapping/>
+  </p:clrMapOvr>
+</p:sld>
+</file>
+
+<file path=ppt/slides/slide21.xml><?xml version="1.0" encoding="utf-8"?>
+<p:sld xmlns:a="http://schemas.openxmlformats.org/drawingml/2006/main" xmlns:r="http://schemas.openxmlformats.org/officeDocument/2006/relationships" xmlns:p="http://schemas.openxmlformats.org/presentationml/2006/main">
+  <p:cSld>
+    <p:spTree>
+      <p:nvGrpSpPr>
+        <p:cNvPr id="1" name=""/>
+        <p:cNvGrpSpPr/>
+        <p:nvPr/>
+      </p:nvGrpSpPr>
+      <p:grpSpPr>
+        <a:xfrm>
+          <a:off x="0" y="0"/>
+          <a:ext cx="0" cy="0"/>
+          <a:chOff x="0" y="0"/>
+          <a:chExt cx="0" cy="0"/>
+        </a:xfrm>
+      </p:grpSpPr>
+      <p:sp>
+        <p:nvSpPr>
+          <p:cNvPr id="2" name="Title 1">
+            <a:extLst>
+              <a:ext uri="{FF2B5EF4-FFF2-40B4-BE49-F238E27FC236}">
+                <a16:creationId xmlns:a16="http://schemas.microsoft.com/office/drawing/2014/main" id="{3A532D5F-4C6F-EC2C-6A90-BDA637AE8089}"/>
+              </a:ext>
+            </a:extLst>
+          </p:cNvPr>
+          <p:cNvSpPr>
+            <a:spLocks noGrp="1"/>
+          </p:cNvSpPr>
+          <p:nvPr>
+            <p:ph type="title"/>
+          </p:nvPr>
+        </p:nvSpPr>
+        <p:spPr>
+          <a:xfrm>
+            <a:off x="165370" y="365125"/>
+            <a:ext cx="3657600" cy="5996764"/>
+          </a:xfrm>
+        </p:spPr>
+        <p:txBody>
+          <a:bodyPr>
+            <a:normAutofit/>
+          </a:bodyPr>
+          <a:lstStyle/>
+          <a:p>
+            <a:r>
+              <a:rPr lang="en-US" dirty="0"/>
+              <a:t>Multiplicative </a:t>
+            </a:r>
+            <a:br>
+              <a:rPr lang="en-US" dirty="0"/>
+            </a:br>
+            <a:r>
+              <a:rPr lang="en-US" dirty="0"/>
+              <a:t>with constraint</a:t>
+            </a:r>
+            <a:br>
+              <a:rPr lang="en-US" dirty="0"/>
+            </a:br>
+            <a:r>
+              <a:rPr lang="en-US" dirty="0"/>
+              <a:t>Vs.</a:t>
+            </a:r>
+            <a:br>
+              <a:rPr lang="en-US" dirty="0"/>
+            </a:br>
+            <a:r>
+              <a:rPr lang="en-US" dirty="0"/>
+              <a:t>Temporal-only </a:t>
+            </a:r>
+            <a:br>
+              <a:rPr lang="en-US" dirty="0"/>
+            </a:br>
+            <a:r>
+              <a:rPr lang="en-US" dirty="0"/>
+              <a:t>with constraint</a:t>
+            </a:r>
+            <a:endParaRPr lang="en-GB" dirty="0"/>
+          </a:p>
+        </p:txBody>
+      </p:sp>
+      <p:pic>
+        <p:nvPicPr>
+          <p:cNvPr id="5" name="Picture 4">
+            <a:extLst>
+              <a:ext uri="{FF2B5EF4-FFF2-40B4-BE49-F238E27FC236}">
+                <a16:creationId xmlns:a16="http://schemas.microsoft.com/office/drawing/2014/main" id="{F23C90CC-74AB-786A-9D6A-7943D69CC848}"/>
+              </a:ext>
+            </a:extLst>
+          </p:cNvPr>
+          <p:cNvPicPr>
+            <a:picLocks noChangeAspect="1"/>
+          </p:cNvPicPr>
+          <p:nvPr/>
+        </p:nvPicPr>
+        <p:blipFill>
+          <a:blip r:embed="rId2"/>
+          <a:stretch>
+            <a:fillRect/>
+          </a:stretch>
+        </p:blipFill>
+        <p:spPr>
+          <a:xfrm>
+            <a:off x="4168505" y="248832"/>
+            <a:ext cx="7858125" cy="6229350"/>
+          </a:xfrm>
+          <a:prstGeom prst="rect">
+            <a:avLst/>
+          </a:prstGeom>
+        </p:spPr>
+      </p:pic>
+    </p:spTree>
+    <p:extLst>
+      <p:ext uri="{BB962C8B-B14F-4D97-AF65-F5344CB8AC3E}">
+        <p14:creationId xmlns:p14="http://schemas.microsoft.com/office/powerpoint/2010/main" val="1007388149"/>
+      </p:ext>
+    </p:extLst>
+  </p:cSld>
+  <p:clrMapOvr>
+    <a:masterClrMapping/>
+  </p:clrMapOvr>
+</p:sld>
+</file>
+
+<file path=ppt/slides/slide22.xml><?xml version="1.0" encoding="utf-8"?>
+<p:sld xmlns:a="http://schemas.openxmlformats.org/drawingml/2006/main" xmlns:r="http://schemas.openxmlformats.org/officeDocument/2006/relationships" xmlns:p="http://schemas.openxmlformats.org/presentationml/2006/main">
+  <p:cSld>
+    <p:spTree>
+      <p:nvGrpSpPr>
+        <p:cNvPr id="1" name=""/>
+        <p:cNvGrpSpPr/>
+        <p:nvPr/>
+      </p:nvGrpSpPr>
+      <p:grpSpPr>
+        <a:xfrm>
+          <a:off x="0" y="0"/>
+          <a:ext cx="0" cy="0"/>
+          <a:chOff x="0" y="0"/>
+          <a:chExt cx="0" cy="0"/>
+        </a:xfrm>
+      </p:grpSpPr>
+      <p:sp>
+        <p:nvSpPr>
+          <p:cNvPr id="2" name="Title 1">
+            <a:extLst>
+              <a:ext uri="{FF2B5EF4-FFF2-40B4-BE49-F238E27FC236}">
+                <a16:creationId xmlns:a16="http://schemas.microsoft.com/office/drawing/2014/main" id="{3A532D5F-4C6F-EC2C-6A90-BDA637AE8089}"/>
+              </a:ext>
+            </a:extLst>
+          </p:cNvPr>
+          <p:cNvSpPr>
+            <a:spLocks noGrp="1"/>
+          </p:cNvSpPr>
+          <p:nvPr>
+            <p:ph type="title"/>
+          </p:nvPr>
+        </p:nvSpPr>
+        <p:spPr>
+          <a:xfrm>
+            <a:off x="165370" y="365125"/>
+            <a:ext cx="3657600" cy="5996764"/>
+          </a:xfrm>
+        </p:spPr>
+        <p:txBody>
+          <a:bodyPr>
+            <a:normAutofit/>
+          </a:bodyPr>
+          <a:lstStyle/>
+          <a:p>
+            <a:r>
+              <a:rPr lang="en-US" dirty="0"/>
+              <a:t>Multiplicative </a:t>
+            </a:r>
+            <a:br>
+              <a:rPr lang="en-US" dirty="0"/>
+            </a:br>
+            <a:r>
+              <a:rPr lang="en-US" dirty="0"/>
+              <a:t>with constraint</a:t>
+            </a:r>
+            <a:br>
+              <a:rPr lang="en-US" dirty="0"/>
+            </a:br>
+            <a:r>
+              <a:rPr lang="en-US" dirty="0"/>
+              <a:t>Vs.</a:t>
+            </a:r>
+            <a:br>
+              <a:rPr lang="en-US" dirty="0"/>
+            </a:br>
+            <a:r>
+              <a:rPr lang="en-US" dirty="0"/>
+              <a:t>Spatial-only </a:t>
+            </a:r>
+            <a:br>
+              <a:rPr lang="en-US" dirty="0"/>
+            </a:br>
+            <a:r>
+              <a:rPr lang="en-US" dirty="0"/>
+              <a:t>with constraint</a:t>
+            </a:r>
+            <a:endParaRPr lang="en-GB" dirty="0"/>
+          </a:p>
+        </p:txBody>
+      </p:sp>
+      <p:pic>
+        <p:nvPicPr>
+          <p:cNvPr id="4" name="Picture 3">
+            <a:extLst>
+              <a:ext uri="{FF2B5EF4-FFF2-40B4-BE49-F238E27FC236}">
+                <a16:creationId xmlns:a16="http://schemas.microsoft.com/office/drawing/2014/main" id="{3F6EB9E1-72C3-476B-E7FF-EF1B23D6B634}"/>
+              </a:ext>
+            </a:extLst>
+          </p:cNvPr>
+          <p:cNvPicPr>
+            <a:picLocks noChangeAspect="1"/>
+          </p:cNvPicPr>
+          <p:nvPr/>
+        </p:nvPicPr>
+        <p:blipFill>
+          <a:blip r:embed="rId2"/>
+          <a:stretch>
+            <a:fillRect/>
+          </a:stretch>
+        </p:blipFill>
+        <p:spPr>
+          <a:xfrm>
+            <a:off x="4324350" y="523875"/>
+            <a:ext cx="7867650" cy="5810250"/>
+          </a:xfrm>
+          <a:prstGeom prst="rect">
+            <a:avLst/>
+          </a:prstGeom>
+        </p:spPr>
+      </p:pic>
+    </p:spTree>
+    <p:extLst>
+      <p:ext uri="{BB962C8B-B14F-4D97-AF65-F5344CB8AC3E}">
+        <p14:creationId xmlns:p14="http://schemas.microsoft.com/office/powerpoint/2010/main" val="3393414232"/>
+      </p:ext>
+    </p:extLst>
+  </p:cSld>
+  <p:clrMapOvr>
+    <a:masterClrMapping/>
+  </p:clrMapOvr>
+</p:sld>
+</file>
+
+<file path=ppt/slides/slide23.xml><?xml version="1.0" encoding="utf-8"?>
+<p:sld xmlns:a="http://schemas.openxmlformats.org/drawingml/2006/main" xmlns:r="http://schemas.openxmlformats.org/officeDocument/2006/relationships" xmlns:p="http://schemas.openxmlformats.org/presentationml/2006/main">
+  <p:cSld>
+    <p:spTree>
+      <p:nvGrpSpPr>
+        <p:cNvPr id="1" name=""/>
+        <p:cNvGrpSpPr/>
+        <p:nvPr/>
+      </p:nvGrpSpPr>
+      <p:grpSpPr>
+        <a:xfrm>
+          <a:off x="0" y="0"/>
+          <a:ext cx="0" cy="0"/>
+          <a:chOff x="0" y="0"/>
+          <a:chExt cx="0" cy="0"/>
+        </a:xfrm>
+      </p:grpSpPr>
+      <p:sp>
+        <p:nvSpPr>
+          <p:cNvPr id="2" name="Title 1">
+            <a:extLst>
+              <a:ext uri="{FF2B5EF4-FFF2-40B4-BE49-F238E27FC236}">
+                <a16:creationId xmlns:a16="http://schemas.microsoft.com/office/drawing/2014/main" id="{70B0C682-8674-9E8D-6ED9-1498BB90D68D}"/>
+              </a:ext>
+            </a:extLst>
+          </p:cNvPr>
+          <p:cNvSpPr>
+            <a:spLocks noGrp="1"/>
+          </p:cNvSpPr>
+          <p:nvPr>
+            <p:ph type="title"/>
+          </p:nvPr>
+        </p:nvSpPr>
+        <p:spPr/>
+        <p:txBody>
+          <a:bodyPr/>
+          <a:lstStyle/>
+          <a:p>
+            <a:r>
+              <a:rPr lang="en-US" dirty="0"/>
+              <a:t>Subject 160 performance</a:t>
+            </a:r>
+            <a:endParaRPr lang="en-GB" dirty="0"/>
+          </a:p>
+        </p:txBody>
+      </p:sp>
+      <p:pic>
+        <p:nvPicPr>
+          <p:cNvPr id="5" name="Picture 4">
+            <a:extLst>
+              <a:ext uri="{FF2B5EF4-FFF2-40B4-BE49-F238E27FC236}">
+                <a16:creationId xmlns:a16="http://schemas.microsoft.com/office/drawing/2014/main" id="{7D67014B-4049-9AE8-4962-2CABA5B28739}"/>
+              </a:ext>
+            </a:extLst>
+          </p:cNvPr>
+          <p:cNvPicPr>
+            <a:picLocks noChangeAspect="1"/>
+          </p:cNvPicPr>
+          <p:nvPr/>
+        </p:nvPicPr>
+        <p:blipFill>
+          <a:blip r:embed="rId2"/>
+          <a:stretch>
+            <a:fillRect/>
+          </a:stretch>
+        </p:blipFill>
+        <p:spPr>
+          <a:xfrm>
+            <a:off x="838200" y="1413282"/>
+            <a:ext cx="2505075" cy="742950"/>
+          </a:xfrm>
+          <a:prstGeom prst="rect">
+            <a:avLst/>
+          </a:prstGeom>
+        </p:spPr>
+      </p:pic>
+      <p:pic>
+        <p:nvPicPr>
+          <p:cNvPr id="7" name="Picture 6">
+            <a:extLst>
+              <a:ext uri="{FF2B5EF4-FFF2-40B4-BE49-F238E27FC236}">
+                <a16:creationId xmlns:a16="http://schemas.microsoft.com/office/drawing/2014/main" id="{8270E5F5-9B38-AB14-046B-7820FF52F299}"/>
+              </a:ext>
+            </a:extLst>
+          </p:cNvPr>
+          <p:cNvPicPr>
+            <a:picLocks noChangeAspect="1"/>
+          </p:cNvPicPr>
+          <p:nvPr/>
+        </p:nvPicPr>
+        <p:blipFill>
+          <a:blip r:embed="rId3"/>
+          <a:stretch>
+            <a:fillRect/>
+          </a:stretch>
+        </p:blipFill>
+        <p:spPr>
+          <a:xfrm>
+            <a:off x="4307920" y="1287980"/>
+            <a:ext cx="5624645" cy="5204895"/>
+          </a:xfrm>
+          <a:prstGeom prst="rect">
+            <a:avLst/>
+          </a:prstGeom>
+        </p:spPr>
+      </p:pic>
+    </p:spTree>
+    <p:extLst>
+      <p:ext uri="{BB962C8B-B14F-4D97-AF65-F5344CB8AC3E}">
+        <p14:creationId xmlns:p14="http://schemas.microsoft.com/office/powerpoint/2010/main" val="2493311981"/>
+      </p:ext>
+    </p:extLst>
+  </p:cSld>
+  <p:clrMapOvr>
+    <a:masterClrMapping/>
+  </p:clrMapOvr>
+</p:sld>
+</file>
+
+<file path=ppt/slides/slide24.xml><?xml version="1.0" encoding="utf-8"?>
+<p:sld xmlns:a="http://schemas.openxmlformats.org/drawingml/2006/main" xmlns:r="http://schemas.openxmlformats.org/officeDocument/2006/relationships" xmlns:p="http://schemas.openxmlformats.org/presentationml/2006/main">
+  <p:cSld>
+    <p:spTree>
+      <p:nvGrpSpPr>
+        <p:cNvPr id="1" name=""/>
+        <p:cNvGrpSpPr/>
+        <p:nvPr/>
+      </p:nvGrpSpPr>
+      <p:grpSpPr>
+        <a:xfrm>
+          <a:off x="0" y="0"/>
+          <a:ext cx="0" cy="0"/>
+          <a:chOff x="0" y="0"/>
+          <a:chExt cx="0" cy="0"/>
+        </a:xfrm>
+      </p:grpSpPr>
+      <p:sp>
+        <p:nvSpPr>
+          <p:cNvPr id="2" name="Title 1">
+            <a:extLst>
+              <a:ext uri="{FF2B5EF4-FFF2-40B4-BE49-F238E27FC236}">
+                <a16:creationId xmlns:a16="http://schemas.microsoft.com/office/drawing/2014/main" id="{3A532D5F-4C6F-EC2C-6A90-BDA637AE8089}"/>
+              </a:ext>
+            </a:extLst>
+          </p:cNvPr>
+          <p:cNvSpPr>
+            <a:spLocks noGrp="1"/>
+          </p:cNvSpPr>
+          <p:nvPr>
+            <p:ph type="title"/>
+          </p:nvPr>
+        </p:nvSpPr>
+        <p:spPr>
+          <a:xfrm>
+            <a:off x="165370" y="365125"/>
+            <a:ext cx="3657600" cy="5996764"/>
+          </a:xfrm>
+        </p:spPr>
+        <p:txBody>
+          <a:bodyPr>
+            <a:normAutofit/>
+          </a:bodyPr>
+          <a:lstStyle/>
+          <a:p>
+            <a:r>
+              <a:rPr lang="en-US" dirty="0"/>
+              <a:t>Temporal-only</a:t>
+            </a:r>
+            <a:br>
+              <a:rPr lang="en-US" dirty="0"/>
+            </a:br>
+            <a:r>
+              <a:rPr lang="en-US" dirty="0"/>
+              <a:t>with constraint</a:t>
+            </a:r>
+            <a:br>
+              <a:rPr lang="en-US" dirty="0"/>
+            </a:br>
+            <a:r>
+              <a:rPr lang="en-US" dirty="0"/>
+              <a:t>Vs.</a:t>
+            </a:r>
+            <a:br>
+              <a:rPr lang="en-US" dirty="0"/>
+            </a:br>
+            <a:r>
+              <a:rPr lang="en-US" dirty="0"/>
+              <a:t>Spatial-only </a:t>
+            </a:r>
+            <a:br>
+              <a:rPr lang="en-US" dirty="0"/>
+            </a:br>
+            <a:r>
+              <a:rPr lang="en-US" dirty="0"/>
+              <a:t>with constraint</a:t>
+            </a:r>
+            <a:endParaRPr lang="en-GB" dirty="0"/>
+          </a:p>
+        </p:txBody>
+      </p:sp>
+      <p:pic>
+        <p:nvPicPr>
+          <p:cNvPr id="4" name="Picture 3">
+            <a:extLst>
+              <a:ext uri="{FF2B5EF4-FFF2-40B4-BE49-F238E27FC236}">
+                <a16:creationId xmlns:a16="http://schemas.microsoft.com/office/drawing/2014/main" id="{78528AB2-A571-1EE9-69C1-6EBD9AFB49E4}"/>
+              </a:ext>
+            </a:extLst>
+          </p:cNvPr>
+          <p:cNvPicPr>
+            <a:picLocks noChangeAspect="1"/>
+          </p:cNvPicPr>
+          <p:nvPr/>
+        </p:nvPicPr>
+        <p:blipFill>
+          <a:blip r:embed="rId2"/>
+          <a:stretch>
+            <a:fillRect/>
+          </a:stretch>
+        </p:blipFill>
+        <p:spPr>
+          <a:xfrm>
+            <a:off x="3930380" y="694514"/>
+            <a:ext cx="8096250" cy="5667375"/>
+          </a:xfrm>
+          <a:prstGeom prst="rect">
+            <a:avLst/>
+          </a:prstGeom>
+        </p:spPr>
+      </p:pic>
+    </p:spTree>
+    <p:extLst>
+      <p:ext uri="{BB962C8B-B14F-4D97-AF65-F5344CB8AC3E}">
+        <p14:creationId xmlns:p14="http://schemas.microsoft.com/office/powerpoint/2010/main" val="4065566103"/>
+      </p:ext>
+    </p:extLst>
+  </p:cSld>
+  <p:clrMapOvr>
+    <a:masterClrMapping/>
+  </p:clrMapOvr>
+</p:sld>
+</file>
+
+<file path=ppt/slides/slide3.xml><?xml version="1.0" encoding="utf-8"?>
 <p:sld xmlns:a="http://schemas.openxmlformats.org/drawingml/2006/main" xmlns:r="http://schemas.openxmlformats.org/officeDocument/2006/relationships" xmlns:p="http://schemas.openxmlformats.org/presentationml/2006/main">
   <p:cSld>
     <p:spTree>
@@ -5025,7 +6101,7 @@
 </p:sld>
 </file>
 
-<file path=ppt/slides/slide3.xml><?xml version="1.0" encoding="utf-8"?>
+<file path=ppt/slides/slide4.xml><?xml version="1.0" encoding="utf-8"?>
 <p:sld xmlns:a="http://schemas.openxmlformats.org/drawingml/2006/main" xmlns:r="http://schemas.openxmlformats.org/officeDocument/2006/relationships" xmlns:p="http://schemas.openxmlformats.org/presentationml/2006/main">
   <p:cSld>
     <p:spTree>
@@ -5160,7 +6236,7 @@
 </p:sld>
 </file>
 
-<file path=ppt/slides/slide4.xml><?xml version="1.0" encoding="utf-8"?>
+<file path=ppt/slides/slide5.xml><?xml version="1.0" encoding="utf-8"?>
 <p:sld xmlns:a="http://schemas.openxmlformats.org/drawingml/2006/main" xmlns:r="http://schemas.openxmlformats.org/officeDocument/2006/relationships" xmlns:p="http://schemas.openxmlformats.org/presentationml/2006/main">
   <p:cSld>
     <p:spTree>
@@ -5300,7 +6376,7 @@
 </p:sld>
 </file>
 
-<file path=ppt/slides/slide5.xml><?xml version="1.0" encoding="utf-8"?>
+<file path=ppt/slides/slide6.xml><?xml version="1.0" encoding="utf-8"?>
 <p:sld xmlns:a="http://schemas.openxmlformats.org/drawingml/2006/main" xmlns:r="http://schemas.openxmlformats.org/officeDocument/2006/relationships" xmlns:p="http://schemas.openxmlformats.org/presentationml/2006/main">
   <p:cSld>
     <p:spTree>
@@ -5426,7 +6502,7 @@
 </p:sld>
 </file>
 
-<file path=ppt/slides/slide6.xml><?xml version="1.0" encoding="utf-8"?>
+<file path=ppt/slides/slide7.xml><?xml version="1.0" encoding="utf-8"?>
 <p:sld xmlns:a="http://schemas.openxmlformats.org/drawingml/2006/main" xmlns:r="http://schemas.openxmlformats.org/officeDocument/2006/relationships" xmlns:p="http://schemas.openxmlformats.org/presentationml/2006/main">
   <p:cSld>
     <p:spTree>
@@ -5552,7 +6628,7 @@
 </p:sld>
 </file>
 
-<file path=ppt/slides/slide7.xml><?xml version="1.0" encoding="utf-8"?>
+<file path=ppt/slides/slide8.xml><?xml version="1.0" encoding="utf-8"?>
 <p:sld xmlns:a="http://schemas.openxmlformats.org/drawingml/2006/main" xmlns:r="http://schemas.openxmlformats.org/officeDocument/2006/relationships" xmlns:p="http://schemas.openxmlformats.org/presentationml/2006/main">
   <p:cSld>
     <p:spTree>
@@ -5685,7 +6761,7 @@
 </p:sld>
 </file>
 
-<file path=ppt/slides/slide8.xml><?xml version="1.0" encoding="utf-8"?>
+<file path=ppt/slides/slide9.xml><?xml version="1.0" encoding="utf-8"?>
 <p:sld xmlns:a="http://schemas.openxmlformats.org/drawingml/2006/main" xmlns:r="http://schemas.openxmlformats.org/officeDocument/2006/relationships" xmlns:p="http://schemas.openxmlformats.org/presentationml/2006/main">
   <p:cSld>
     <p:spTree>
@@ -5802,132 +6878,6 @@
     <p:extLst>
       <p:ext uri="{BB962C8B-B14F-4D97-AF65-F5344CB8AC3E}">
         <p14:creationId xmlns:p14="http://schemas.microsoft.com/office/powerpoint/2010/main" val="3930993668"/>
-      </p:ext>
-    </p:extLst>
-  </p:cSld>
-  <p:clrMapOvr>
-    <a:masterClrMapping/>
-  </p:clrMapOvr>
-</p:sld>
-</file>
-
-<file path=ppt/slides/slide9.xml><?xml version="1.0" encoding="utf-8"?>
-<p:sld xmlns:a="http://schemas.openxmlformats.org/drawingml/2006/main" xmlns:r="http://schemas.openxmlformats.org/officeDocument/2006/relationships" xmlns:p="http://schemas.openxmlformats.org/presentationml/2006/main">
-  <p:cSld>
-    <p:spTree>
-      <p:nvGrpSpPr>
-        <p:cNvPr id="1" name=""/>
-        <p:cNvGrpSpPr/>
-        <p:nvPr/>
-      </p:nvGrpSpPr>
-      <p:grpSpPr>
-        <a:xfrm>
-          <a:off x="0" y="0"/>
-          <a:ext cx="0" cy="0"/>
-          <a:chOff x="0" y="0"/>
-          <a:chExt cx="0" cy="0"/>
-        </a:xfrm>
-      </p:grpSpPr>
-      <p:sp>
-        <p:nvSpPr>
-          <p:cNvPr id="2" name="Title 1">
-            <a:extLst>
-              <a:ext uri="{FF2B5EF4-FFF2-40B4-BE49-F238E27FC236}">
-                <a16:creationId xmlns:a16="http://schemas.microsoft.com/office/drawing/2014/main" id="{6B806895-1D5F-4602-547D-0D03C14414C4}"/>
-              </a:ext>
-            </a:extLst>
-          </p:cNvPr>
-          <p:cNvSpPr>
-            <a:spLocks noGrp="1"/>
-          </p:cNvSpPr>
-          <p:nvPr>
-            <p:ph type="title"/>
-          </p:nvPr>
-        </p:nvSpPr>
-        <p:spPr/>
-        <p:txBody>
-          <a:bodyPr/>
-          <a:lstStyle/>
-          <a:p>
-            <a:r>
-              <a:rPr lang="en-US" dirty="0"/>
-              <a:t>Spatial-Only Model</a:t>
-            </a:r>
-            <a:endParaRPr lang="en-GB" dirty="0"/>
-          </a:p>
-        </p:txBody>
-      </p:sp>
-      <p:sp>
-        <p:nvSpPr>
-          <p:cNvPr id="3" name="Content Placeholder 2">
-            <a:extLst>
-              <a:ext uri="{FF2B5EF4-FFF2-40B4-BE49-F238E27FC236}">
-                <a16:creationId xmlns:a16="http://schemas.microsoft.com/office/drawing/2014/main" id="{215A26A4-CDF1-26D9-A6CD-320D31C2CD2E}"/>
-              </a:ext>
-            </a:extLst>
-          </p:cNvPr>
-          <p:cNvSpPr>
-            <a:spLocks noGrp="1"/>
-          </p:cNvSpPr>
-          <p:nvPr>
-            <p:ph idx="1"/>
-          </p:nvPr>
-        </p:nvSpPr>
-        <p:spPr/>
-        <p:txBody>
-          <a:bodyPr/>
-          <a:lstStyle/>
-          <a:p>
-            <a:r>
-              <a:rPr lang="en-US" dirty="0"/>
-              <a:t>4 Parameters (s1, s2, s3, s4)</a:t>
-            </a:r>
-          </a:p>
-          <a:p>
-            <a:r>
-              <a:rPr lang="en-US" dirty="0"/>
-              <a:t>Defined as: sLevelValue.</a:t>
-            </a:r>
-          </a:p>
-          <a:p>
-            <a:endParaRPr lang="en-GB" dirty="0"/>
-          </a:p>
-        </p:txBody>
-      </p:sp>
-      <p:pic>
-        <p:nvPicPr>
-          <p:cNvPr id="5" name="Picture 4">
-            <a:extLst>
-              <a:ext uri="{FF2B5EF4-FFF2-40B4-BE49-F238E27FC236}">
-                <a16:creationId xmlns:a16="http://schemas.microsoft.com/office/drawing/2014/main" id="{1EA4F39B-8C5D-D8AC-BD37-4EACFECDB799}"/>
-              </a:ext>
-            </a:extLst>
-          </p:cNvPr>
-          <p:cNvPicPr>
-            <a:picLocks noChangeAspect="1"/>
-          </p:cNvPicPr>
-          <p:nvPr/>
-        </p:nvPicPr>
-        <p:blipFill>
-          <a:blip r:embed="rId2"/>
-          <a:stretch>
-            <a:fillRect/>
-          </a:stretch>
-        </p:blipFill>
-        <p:spPr>
-          <a:xfrm>
-            <a:off x="6096000" y="1404938"/>
-            <a:ext cx="4810125" cy="4772025"/>
-          </a:xfrm>
-          <a:prstGeom prst="rect">
-            <a:avLst/>
-          </a:prstGeom>
-        </p:spPr>
-      </p:pic>
-    </p:spTree>
-    <p:extLst>
-      <p:ext uri="{BB962C8B-B14F-4D97-AF65-F5344CB8AC3E}">
-        <p14:creationId xmlns:p14="http://schemas.microsoft.com/office/powerpoint/2010/main" val="1547859141"/>
       </p:ext>
     </p:extLst>
   </p:cSld>

</xml_diff>

<commit_message>
worked on the presentation
</commit_message>
<xml_diff>
--- a/Modeling Results.pptx
+++ b/Modeling Results.pptx
@@ -29,6 +29,7 @@
     <p:sldId id="277" r:id="rId23"/>
     <p:sldId id="279" r:id="rId24"/>
     <p:sldId id="278" r:id="rId25"/>
+    <p:sldId id="281" r:id="rId26"/>
   </p:sldIdLst>
   <p:sldSz cx="12192000" cy="6858000"/>
   <p:notesSz cx="6858000" cy="9144000"/>
@@ -284,7 +285,7 @@
           <a:p>
             <a:fld id="{43208139-D7BC-4419-A81A-A3FD5F89F6CD}" type="datetimeFigureOut">
               <a:rPr lang="en-GB" smtClean="0"/>
-              <a:t>15/11/2023</a:t>
+              <a:t>20/11/2023</a:t>
             </a:fld>
             <a:endParaRPr lang="en-GB"/>
           </a:p>
@@ -484,7 +485,7 @@
           <a:p>
             <a:fld id="{43208139-D7BC-4419-A81A-A3FD5F89F6CD}" type="datetimeFigureOut">
               <a:rPr lang="en-GB" smtClean="0"/>
-              <a:t>15/11/2023</a:t>
+              <a:t>20/11/2023</a:t>
             </a:fld>
             <a:endParaRPr lang="en-GB"/>
           </a:p>
@@ -694,7 +695,7 @@
           <a:p>
             <a:fld id="{43208139-D7BC-4419-A81A-A3FD5F89F6CD}" type="datetimeFigureOut">
               <a:rPr lang="en-GB" smtClean="0"/>
-              <a:t>15/11/2023</a:t>
+              <a:t>20/11/2023</a:t>
             </a:fld>
             <a:endParaRPr lang="en-GB"/>
           </a:p>
@@ -894,7 +895,7 @@
           <a:p>
             <a:fld id="{43208139-D7BC-4419-A81A-A3FD5F89F6CD}" type="datetimeFigureOut">
               <a:rPr lang="en-GB" smtClean="0"/>
-              <a:t>15/11/2023</a:t>
+              <a:t>20/11/2023</a:t>
             </a:fld>
             <a:endParaRPr lang="en-GB"/>
           </a:p>
@@ -1170,7 +1171,7 @@
           <a:p>
             <a:fld id="{43208139-D7BC-4419-A81A-A3FD5F89F6CD}" type="datetimeFigureOut">
               <a:rPr lang="en-GB" smtClean="0"/>
-              <a:t>15/11/2023</a:t>
+              <a:t>20/11/2023</a:t>
             </a:fld>
             <a:endParaRPr lang="en-GB"/>
           </a:p>
@@ -1438,7 +1439,7 @@
           <a:p>
             <a:fld id="{43208139-D7BC-4419-A81A-A3FD5F89F6CD}" type="datetimeFigureOut">
               <a:rPr lang="en-GB" smtClean="0"/>
-              <a:t>15/11/2023</a:t>
+              <a:t>20/11/2023</a:t>
             </a:fld>
             <a:endParaRPr lang="en-GB"/>
           </a:p>
@@ -1853,7 +1854,7 @@
           <a:p>
             <a:fld id="{43208139-D7BC-4419-A81A-A3FD5F89F6CD}" type="datetimeFigureOut">
               <a:rPr lang="en-GB" smtClean="0"/>
-              <a:t>15/11/2023</a:t>
+              <a:t>20/11/2023</a:t>
             </a:fld>
             <a:endParaRPr lang="en-GB"/>
           </a:p>
@@ -1995,7 +1996,7 @@
           <a:p>
             <a:fld id="{43208139-D7BC-4419-A81A-A3FD5F89F6CD}" type="datetimeFigureOut">
               <a:rPr lang="en-GB" smtClean="0"/>
-              <a:t>15/11/2023</a:t>
+              <a:t>20/11/2023</a:t>
             </a:fld>
             <a:endParaRPr lang="en-GB"/>
           </a:p>
@@ -2108,7 +2109,7 @@
           <a:p>
             <a:fld id="{43208139-D7BC-4419-A81A-A3FD5F89F6CD}" type="datetimeFigureOut">
               <a:rPr lang="en-GB" smtClean="0"/>
-              <a:t>15/11/2023</a:t>
+              <a:t>20/11/2023</a:t>
             </a:fld>
             <a:endParaRPr lang="en-GB"/>
           </a:p>
@@ -2421,7 +2422,7 @@
           <a:p>
             <a:fld id="{43208139-D7BC-4419-A81A-A3FD5F89F6CD}" type="datetimeFigureOut">
               <a:rPr lang="en-GB" smtClean="0"/>
-              <a:t>15/11/2023</a:t>
+              <a:t>20/11/2023</a:t>
             </a:fld>
             <a:endParaRPr lang="en-GB"/>
           </a:p>
@@ -2710,7 +2711,7 @@
           <a:p>
             <a:fld id="{43208139-D7BC-4419-A81A-A3FD5F89F6CD}" type="datetimeFigureOut">
               <a:rPr lang="en-GB" smtClean="0"/>
-              <a:t>15/11/2023</a:t>
+              <a:t>20/11/2023</a:t>
             </a:fld>
             <a:endParaRPr lang="en-GB"/>
           </a:p>
@@ -2953,7 +2954,7 @@
           <a:p>
             <a:fld id="{43208139-D7BC-4419-A81A-A3FD5F89F6CD}" type="datetimeFigureOut">
               <a:rPr lang="en-GB" smtClean="0"/>
-              <a:t>15/11/2023</a:t>
+              <a:t>20/11/2023</a:t>
             </a:fld>
             <a:endParaRPr lang="en-GB"/>
           </a:p>
@@ -5609,7 +5610,12 @@
             <p:ph type="title"/>
           </p:nvPr>
         </p:nvSpPr>
-        <p:spPr/>
+        <p:spPr>
+          <a:xfrm>
+            <a:off x="838200" y="365125"/>
+            <a:ext cx="3205640" cy="1325563"/>
+          </a:xfrm>
+        </p:spPr>
         <p:txBody>
           <a:bodyPr/>
           <a:lstStyle/>
@@ -5644,7 +5650,7 @@
         </p:blipFill>
         <p:spPr>
           <a:xfrm>
-            <a:off x="838200" y="1413282"/>
+            <a:off x="4275933" y="656431"/>
             <a:ext cx="2505075" cy="742950"/>
           </a:xfrm>
           <a:prstGeom prst="rect">
@@ -5674,8 +5680,101 @@
         </p:blipFill>
         <p:spPr>
           <a:xfrm>
-            <a:off x="4307920" y="1287980"/>
-            <a:ext cx="5624645" cy="5204895"/>
+            <a:off x="838200" y="1690686"/>
+            <a:ext cx="5189459" cy="4802186"/>
+          </a:xfrm>
+          <a:prstGeom prst="rect">
+            <a:avLst/>
+          </a:prstGeom>
+        </p:spPr>
+      </p:pic>
+      <p:sp>
+        <p:nvSpPr>
+          <p:cNvPr id="3" name="TextBox 2">
+            <a:extLst>
+              <a:ext uri="{FF2B5EF4-FFF2-40B4-BE49-F238E27FC236}">
+                <a16:creationId xmlns:a16="http://schemas.microsoft.com/office/drawing/2014/main" id="{A98BE071-D7B6-EC23-BE88-8DEA6BB98B53}"/>
+              </a:ext>
+            </a:extLst>
+          </p:cNvPr>
+          <p:cNvSpPr txBox="1"/>
+          <p:nvPr/>
+        </p:nvSpPr>
+        <p:spPr>
+          <a:xfrm>
+            <a:off x="7013101" y="490356"/>
+            <a:ext cx="3247239" cy="1200329"/>
+          </a:xfrm>
+          <a:prstGeom prst="rect">
+            <a:avLst/>
+          </a:prstGeom>
+          <a:noFill/>
+        </p:spPr>
+        <p:txBody>
+          <a:bodyPr wrap="square" rtlCol="0">
+            <a:spAutoFit/>
+          </a:bodyPr>
+          <a:lstStyle/>
+          <a:p>
+            <a:r>
+              <a:rPr lang="en-US" dirty="0"/>
+              <a:t>Research Assistant Notes:</a:t>
+            </a:r>
+          </a:p>
+          <a:p>
+            <a:pPr algn="r" rtl="1"/>
+            <a:r>
+              <a:rPr lang="en-GB" dirty="0"/>
+              <a:t>“</a:t>
+            </a:r>
+            <a:r>
+              <a:rPr lang="he-IL" b="0" i="0" dirty="0">
+                <a:solidFill>
+                  <a:srgbClr val="1F1F1F"/>
+                </a:solidFill>
+                <a:effectLst/>
+                <a:latin typeface="Google Sans"/>
+              </a:rPr>
+              <a:t>היה לנבדק הרבה יותר קל לזהות את השינויים המרחביים מאשר את השינויים הטמפורליים.</a:t>
+            </a:r>
+            <a:r>
+              <a:rPr lang="en-US" b="0" i="0" dirty="0">
+                <a:solidFill>
+                  <a:srgbClr val="1F1F1F"/>
+                </a:solidFill>
+                <a:effectLst/>
+                <a:latin typeface="Google Sans"/>
+              </a:rPr>
+              <a:t>"</a:t>
+            </a:r>
+            <a:endParaRPr lang="en-GB" dirty="0"/>
+          </a:p>
+        </p:txBody>
+      </p:sp>
+      <p:pic>
+        <p:nvPicPr>
+          <p:cNvPr id="6" name="Picture 5">
+            <a:extLst>
+              <a:ext uri="{FF2B5EF4-FFF2-40B4-BE49-F238E27FC236}">
+                <a16:creationId xmlns:a16="http://schemas.microsoft.com/office/drawing/2014/main" id="{1078A00D-E31D-2AF6-C856-019D167E0B45}"/>
+              </a:ext>
+            </a:extLst>
+          </p:cNvPr>
+          <p:cNvPicPr>
+            <a:picLocks noChangeAspect="1"/>
+          </p:cNvPicPr>
+          <p:nvPr/>
+        </p:nvPicPr>
+        <p:blipFill>
+          <a:blip r:embed="rId4"/>
+          <a:stretch>
+            <a:fillRect/>
+          </a:stretch>
+        </p:blipFill>
+        <p:spPr>
+          <a:xfrm>
+            <a:off x="6449011" y="1690685"/>
+            <a:ext cx="5308487" cy="4802187"/>
           </a:xfrm>
           <a:prstGeom prst="rect">
             <a:avLst/>
@@ -5806,10 +5905,177 @@
           </a:prstGeom>
         </p:spPr>
       </p:pic>
+      <p:sp>
+        <p:nvSpPr>
+          <p:cNvPr id="3" name="TextBox 2">
+            <a:extLst>
+              <a:ext uri="{FF2B5EF4-FFF2-40B4-BE49-F238E27FC236}">
+                <a16:creationId xmlns:a16="http://schemas.microsoft.com/office/drawing/2014/main" id="{16B902FB-1EE7-C978-68B4-43507A01D81D}"/>
+              </a:ext>
+            </a:extLst>
+          </p:cNvPr>
+          <p:cNvSpPr txBox="1"/>
+          <p:nvPr/>
+        </p:nvSpPr>
+        <p:spPr>
+          <a:xfrm>
+            <a:off x="389106" y="4990289"/>
+            <a:ext cx="3433864" cy="923330"/>
+          </a:xfrm>
+          <a:prstGeom prst="rect">
+            <a:avLst/>
+          </a:prstGeom>
+          <a:noFill/>
+        </p:spPr>
+        <p:txBody>
+          <a:bodyPr wrap="square" rtlCol="0">
+            <a:spAutoFit/>
+          </a:bodyPr>
+          <a:lstStyle/>
+          <a:p>
+            <a:r>
+              <a:rPr lang="en-US" dirty="0"/>
+              <a:t>Problem with the experiment (?)</a:t>
+            </a:r>
+          </a:p>
+          <a:p>
+            <a:r>
+              <a:rPr lang="en-US" dirty="0"/>
+              <a:t>Less confidence in modal (?) </a:t>
+            </a:r>
+          </a:p>
+          <a:p>
+            <a:r>
+              <a:rPr lang="en-US" dirty="0"/>
+              <a:t>Less experience with modal (?)</a:t>
+            </a:r>
+            <a:endParaRPr lang="en-GB" dirty="0"/>
+          </a:p>
+        </p:txBody>
+      </p:sp>
     </p:spTree>
     <p:extLst>
       <p:ext uri="{BB962C8B-B14F-4D97-AF65-F5344CB8AC3E}">
         <p14:creationId xmlns:p14="http://schemas.microsoft.com/office/powerpoint/2010/main" val="4065566103"/>
+      </p:ext>
+    </p:extLst>
+  </p:cSld>
+  <p:clrMapOvr>
+    <a:masterClrMapping/>
+  </p:clrMapOvr>
+</p:sld>
+</file>
+
+<file path=ppt/slides/slide25.xml><?xml version="1.0" encoding="utf-8"?>
+<p:sld xmlns:a="http://schemas.openxmlformats.org/drawingml/2006/main" xmlns:r="http://schemas.openxmlformats.org/officeDocument/2006/relationships" xmlns:p="http://schemas.openxmlformats.org/presentationml/2006/main">
+  <p:cSld>
+    <p:spTree>
+      <p:nvGrpSpPr>
+        <p:cNvPr id="1" name=""/>
+        <p:cNvGrpSpPr/>
+        <p:nvPr/>
+      </p:nvGrpSpPr>
+      <p:grpSpPr>
+        <a:xfrm>
+          <a:off x="0" y="0"/>
+          <a:ext cx="0" cy="0"/>
+          <a:chOff x="0" y="0"/>
+          <a:chExt cx="0" cy="0"/>
+        </a:xfrm>
+      </p:grpSpPr>
+      <p:sp>
+        <p:nvSpPr>
+          <p:cNvPr id="2" name="Title 1">
+            <a:extLst>
+              <a:ext uri="{FF2B5EF4-FFF2-40B4-BE49-F238E27FC236}">
+                <a16:creationId xmlns:a16="http://schemas.microsoft.com/office/drawing/2014/main" id="{D97015CE-779F-C70C-196D-698209BE6080}"/>
+              </a:ext>
+            </a:extLst>
+          </p:cNvPr>
+          <p:cNvSpPr>
+            <a:spLocks noGrp="1"/>
+          </p:cNvSpPr>
+          <p:nvPr>
+            <p:ph type="title"/>
+          </p:nvPr>
+        </p:nvSpPr>
+        <p:spPr/>
+        <p:txBody>
+          <a:bodyPr/>
+          <a:lstStyle/>
+          <a:p>
+            <a:r>
+              <a:rPr lang="en-US" dirty="0"/>
+              <a:t>Temporal and Spatial performance</a:t>
+            </a:r>
+            <a:endParaRPr lang="en-GB" dirty="0"/>
+          </a:p>
+        </p:txBody>
+      </p:sp>
+      <p:pic>
+        <p:nvPicPr>
+          <p:cNvPr id="5" name="Picture 4">
+            <a:extLst>
+              <a:ext uri="{FF2B5EF4-FFF2-40B4-BE49-F238E27FC236}">
+                <a16:creationId xmlns:a16="http://schemas.microsoft.com/office/drawing/2014/main" id="{2DE94DF4-B188-C402-9B5C-49BAC2FFC313}"/>
+              </a:ext>
+            </a:extLst>
+          </p:cNvPr>
+          <p:cNvPicPr>
+            <a:picLocks noChangeAspect="1"/>
+          </p:cNvPicPr>
+          <p:nvPr/>
+        </p:nvPicPr>
+        <p:blipFill>
+          <a:blip r:embed="rId2"/>
+          <a:stretch>
+            <a:fillRect/>
+          </a:stretch>
+        </p:blipFill>
+        <p:spPr>
+          <a:xfrm>
+            <a:off x="838200" y="1690688"/>
+            <a:ext cx="5284106" cy="3980538"/>
+          </a:xfrm>
+          <a:prstGeom prst="rect">
+            <a:avLst/>
+          </a:prstGeom>
+        </p:spPr>
+      </p:pic>
+      <p:pic>
+        <p:nvPicPr>
+          <p:cNvPr id="7" name="Picture 6">
+            <a:extLst>
+              <a:ext uri="{FF2B5EF4-FFF2-40B4-BE49-F238E27FC236}">
+                <a16:creationId xmlns:a16="http://schemas.microsoft.com/office/drawing/2014/main" id="{CFEE8F7F-4712-2B11-F604-23617FF0A9A5}"/>
+              </a:ext>
+            </a:extLst>
+          </p:cNvPr>
+          <p:cNvPicPr>
+            <a:picLocks noChangeAspect="1"/>
+          </p:cNvPicPr>
+          <p:nvPr/>
+        </p:nvPicPr>
+        <p:blipFill>
+          <a:blip r:embed="rId3"/>
+          <a:stretch>
+            <a:fillRect/>
+          </a:stretch>
+        </p:blipFill>
+        <p:spPr>
+          <a:xfrm>
+            <a:off x="6123839" y="1690687"/>
+            <a:ext cx="5229961" cy="4155635"/>
+          </a:xfrm>
+          <a:prstGeom prst="rect">
+            <a:avLst/>
+          </a:prstGeom>
+        </p:spPr>
+      </p:pic>
+    </p:spTree>
+    <p:extLst>
+      <p:ext uri="{BB962C8B-B14F-4D97-AF65-F5344CB8AC3E}">
+        <p14:creationId xmlns:p14="http://schemas.microsoft.com/office/powerpoint/2010/main" val="331316633"/>
       </p:ext>
     </p:extLst>
   </p:cSld>

</xml_diff>

<commit_message>
fixed comments and finished presentation
</commit_message>
<xml_diff>
--- a/Modeling Results.pptx
+++ b/Modeling Results.pptx
@@ -30,6 +30,7 @@
     <p:sldId id="279" r:id="rId24"/>
     <p:sldId id="278" r:id="rId25"/>
     <p:sldId id="281" r:id="rId26"/>
+    <p:sldId id="282" r:id="rId27"/>
   </p:sldIdLst>
   <p:sldSz cx="12192000" cy="6858000"/>
   <p:notesSz cx="6858000" cy="9144000"/>
@@ -285,7 +286,7 @@
           <a:p>
             <a:fld id="{43208139-D7BC-4419-A81A-A3FD5F89F6CD}" type="datetimeFigureOut">
               <a:rPr lang="en-GB" smtClean="0"/>
-              <a:t>20/11/2023</a:t>
+              <a:t>21/11/2023</a:t>
             </a:fld>
             <a:endParaRPr lang="en-GB"/>
           </a:p>
@@ -485,7 +486,7 @@
           <a:p>
             <a:fld id="{43208139-D7BC-4419-A81A-A3FD5F89F6CD}" type="datetimeFigureOut">
               <a:rPr lang="en-GB" smtClean="0"/>
-              <a:t>20/11/2023</a:t>
+              <a:t>21/11/2023</a:t>
             </a:fld>
             <a:endParaRPr lang="en-GB"/>
           </a:p>
@@ -695,7 +696,7 @@
           <a:p>
             <a:fld id="{43208139-D7BC-4419-A81A-A3FD5F89F6CD}" type="datetimeFigureOut">
               <a:rPr lang="en-GB" smtClean="0"/>
-              <a:t>20/11/2023</a:t>
+              <a:t>21/11/2023</a:t>
             </a:fld>
             <a:endParaRPr lang="en-GB"/>
           </a:p>
@@ -895,7 +896,7 @@
           <a:p>
             <a:fld id="{43208139-D7BC-4419-A81A-A3FD5F89F6CD}" type="datetimeFigureOut">
               <a:rPr lang="en-GB" smtClean="0"/>
-              <a:t>20/11/2023</a:t>
+              <a:t>21/11/2023</a:t>
             </a:fld>
             <a:endParaRPr lang="en-GB"/>
           </a:p>
@@ -1171,7 +1172,7 @@
           <a:p>
             <a:fld id="{43208139-D7BC-4419-A81A-A3FD5F89F6CD}" type="datetimeFigureOut">
               <a:rPr lang="en-GB" smtClean="0"/>
-              <a:t>20/11/2023</a:t>
+              <a:t>21/11/2023</a:t>
             </a:fld>
             <a:endParaRPr lang="en-GB"/>
           </a:p>
@@ -1439,7 +1440,7 @@
           <a:p>
             <a:fld id="{43208139-D7BC-4419-A81A-A3FD5F89F6CD}" type="datetimeFigureOut">
               <a:rPr lang="en-GB" smtClean="0"/>
-              <a:t>20/11/2023</a:t>
+              <a:t>21/11/2023</a:t>
             </a:fld>
             <a:endParaRPr lang="en-GB"/>
           </a:p>
@@ -1854,7 +1855,7 @@
           <a:p>
             <a:fld id="{43208139-D7BC-4419-A81A-A3FD5F89F6CD}" type="datetimeFigureOut">
               <a:rPr lang="en-GB" smtClean="0"/>
-              <a:t>20/11/2023</a:t>
+              <a:t>21/11/2023</a:t>
             </a:fld>
             <a:endParaRPr lang="en-GB"/>
           </a:p>
@@ -1996,7 +1997,7 @@
           <a:p>
             <a:fld id="{43208139-D7BC-4419-A81A-A3FD5F89F6CD}" type="datetimeFigureOut">
               <a:rPr lang="en-GB" smtClean="0"/>
-              <a:t>20/11/2023</a:t>
+              <a:t>21/11/2023</a:t>
             </a:fld>
             <a:endParaRPr lang="en-GB"/>
           </a:p>
@@ -2109,7 +2110,7 @@
           <a:p>
             <a:fld id="{43208139-D7BC-4419-A81A-A3FD5F89F6CD}" type="datetimeFigureOut">
               <a:rPr lang="en-GB" smtClean="0"/>
-              <a:t>20/11/2023</a:t>
+              <a:t>21/11/2023</a:t>
             </a:fld>
             <a:endParaRPr lang="en-GB"/>
           </a:p>
@@ -2422,7 +2423,7 @@
           <a:p>
             <a:fld id="{43208139-D7BC-4419-A81A-A3FD5F89F6CD}" type="datetimeFigureOut">
               <a:rPr lang="en-GB" smtClean="0"/>
-              <a:t>20/11/2023</a:t>
+              <a:t>21/11/2023</a:t>
             </a:fld>
             <a:endParaRPr lang="en-GB"/>
           </a:p>
@@ -2711,7 +2712,7 @@
           <a:p>
             <a:fld id="{43208139-D7BC-4419-A81A-A3FD5F89F6CD}" type="datetimeFigureOut">
               <a:rPr lang="en-GB" smtClean="0"/>
-              <a:t>20/11/2023</a:t>
+              <a:t>21/11/2023</a:t>
             </a:fld>
             <a:endParaRPr lang="en-GB"/>
           </a:p>
@@ -2954,7 +2955,7 @@
           <a:p>
             <a:fld id="{43208139-D7BC-4419-A81A-A3FD5F89F6CD}" type="datetimeFigureOut">
               <a:rPr lang="en-GB" smtClean="0"/>
-              <a:t>20/11/2023</a:t>
+              <a:t>21/11/2023</a:t>
             </a:fld>
             <a:endParaRPr lang="en-GB"/>
           </a:p>
@@ -6076,6 +6077,102 @@
     <p:extLst>
       <p:ext uri="{BB962C8B-B14F-4D97-AF65-F5344CB8AC3E}">
         <p14:creationId xmlns:p14="http://schemas.microsoft.com/office/powerpoint/2010/main" val="331316633"/>
+      </p:ext>
+    </p:extLst>
+  </p:cSld>
+  <p:clrMapOvr>
+    <a:masterClrMapping/>
+  </p:clrMapOvr>
+</p:sld>
+</file>
+
+<file path=ppt/slides/slide26.xml><?xml version="1.0" encoding="utf-8"?>
+<p:sld xmlns:a="http://schemas.openxmlformats.org/drawingml/2006/main" xmlns:r="http://schemas.openxmlformats.org/officeDocument/2006/relationships" xmlns:p="http://schemas.openxmlformats.org/presentationml/2006/main">
+  <p:cSld>
+    <p:spTree>
+      <p:nvGrpSpPr>
+        <p:cNvPr id="1" name=""/>
+        <p:cNvGrpSpPr/>
+        <p:nvPr/>
+      </p:nvGrpSpPr>
+      <p:grpSpPr>
+        <a:xfrm>
+          <a:off x="0" y="0"/>
+          <a:ext cx="0" cy="0"/>
+          <a:chOff x="0" y="0"/>
+          <a:chExt cx="0" cy="0"/>
+        </a:xfrm>
+      </p:grpSpPr>
+      <p:sp>
+        <p:nvSpPr>
+          <p:cNvPr id="2" name="Title 1">
+            <a:extLst>
+              <a:ext uri="{FF2B5EF4-FFF2-40B4-BE49-F238E27FC236}">
+                <a16:creationId xmlns:a16="http://schemas.microsoft.com/office/drawing/2014/main" id="{DD966A62-7EA5-E63F-F251-5A59DF61FF7B}"/>
+              </a:ext>
+            </a:extLst>
+          </p:cNvPr>
+          <p:cNvSpPr>
+            <a:spLocks noGrp="1"/>
+          </p:cNvSpPr>
+          <p:nvPr>
+            <p:ph type="title"/>
+          </p:nvPr>
+        </p:nvSpPr>
+        <p:spPr/>
+        <p:txBody>
+          <a:bodyPr/>
+          <a:lstStyle/>
+          <a:p>
+            <a:endParaRPr lang="en-GB"/>
+          </a:p>
+        </p:txBody>
+      </p:sp>
+      <p:sp>
+        <p:nvSpPr>
+          <p:cNvPr id="3" name="Content Placeholder 2">
+            <a:extLst>
+              <a:ext uri="{FF2B5EF4-FFF2-40B4-BE49-F238E27FC236}">
+                <a16:creationId xmlns:a16="http://schemas.microsoft.com/office/drawing/2014/main" id="{468067A5-D8A1-CFE0-8FBF-1B4024B82F6E}"/>
+              </a:ext>
+            </a:extLst>
+          </p:cNvPr>
+          <p:cNvSpPr>
+            <a:spLocks noGrp="1"/>
+          </p:cNvSpPr>
+          <p:nvPr>
+            <p:ph idx="1"/>
+          </p:nvPr>
+        </p:nvSpPr>
+        <p:spPr/>
+        <p:txBody>
+          <a:bodyPr/>
+          <a:lstStyle/>
+          <a:p>
+            <a:r>
+              <a:rPr lang="en-US" dirty="0"/>
+              <a:t>Code review (MATLAB, Python)</a:t>
+            </a:r>
+          </a:p>
+          <a:p>
+            <a:r>
+              <a:rPr lang="en-US" dirty="0"/>
+              <a:t>Pre-registration</a:t>
+            </a:r>
+          </a:p>
+          <a:p>
+            <a:r>
+              <a:rPr lang="en-US" dirty="0"/>
+              <a:t>Order project &amp; knowledge transfer</a:t>
+            </a:r>
+            <a:endParaRPr lang="en-GB" dirty="0"/>
+          </a:p>
+        </p:txBody>
+      </p:sp>
+    </p:spTree>
+    <p:extLst>
+      <p:ext uri="{BB962C8B-B14F-4D97-AF65-F5344CB8AC3E}">
+        <p14:creationId xmlns:p14="http://schemas.microsoft.com/office/powerpoint/2010/main" val="3645914465"/>
       </p:ext>
     </p:extLst>
   </p:cSld>

</xml_diff>

<commit_message>
added no constraint comparisons
</commit_message>
<xml_diff>
--- a/Modeling Results.pptx
+++ b/Modeling Results.pptx
@@ -31,6 +31,15 @@
     <p:sldId id="278" r:id="rId25"/>
     <p:sldId id="281" r:id="rId26"/>
     <p:sldId id="282" r:id="rId27"/>
+    <p:sldId id="283" r:id="rId28"/>
+    <p:sldId id="284" r:id="rId29"/>
+    <p:sldId id="285" r:id="rId30"/>
+    <p:sldId id="286" r:id="rId31"/>
+    <p:sldId id="287" r:id="rId32"/>
+    <p:sldId id="288" r:id="rId33"/>
+    <p:sldId id="289" r:id="rId34"/>
+    <p:sldId id="290" r:id="rId35"/>
+    <p:sldId id="291" r:id="rId36"/>
   </p:sldIdLst>
   <p:sldSz cx="12192000" cy="6858000"/>
   <p:notesSz cx="6858000" cy="9144000"/>
@@ -286,7 +295,7 @@
           <a:p>
             <a:fld id="{43208139-D7BC-4419-A81A-A3FD5F89F6CD}" type="datetimeFigureOut">
               <a:rPr lang="en-GB" smtClean="0"/>
-              <a:t>21/11/2023</a:t>
+              <a:t>23/11/2023</a:t>
             </a:fld>
             <a:endParaRPr lang="en-GB"/>
           </a:p>
@@ -486,7 +495,7 @@
           <a:p>
             <a:fld id="{43208139-D7BC-4419-A81A-A3FD5F89F6CD}" type="datetimeFigureOut">
               <a:rPr lang="en-GB" smtClean="0"/>
-              <a:t>21/11/2023</a:t>
+              <a:t>23/11/2023</a:t>
             </a:fld>
             <a:endParaRPr lang="en-GB"/>
           </a:p>
@@ -696,7 +705,7 @@
           <a:p>
             <a:fld id="{43208139-D7BC-4419-A81A-A3FD5F89F6CD}" type="datetimeFigureOut">
               <a:rPr lang="en-GB" smtClean="0"/>
-              <a:t>21/11/2023</a:t>
+              <a:t>23/11/2023</a:t>
             </a:fld>
             <a:endParaRPr lang="en-GB"/>
           </a:p>
@@ -896,7 +905,7 @@
           <a:p>
             <a:fld id="{43208139-D7BC-4419-A81A-A3FD5F89F6CD}" type="datetimeFigureOut">
               <a:rPr lang="en-GB" smtClean="0"/>
-              <a:t>21/11/2023</a:t>
+              <a:t>23/11/2023</a:t>
             </a:fld>
             <a:endParaRPr lang="en-GB"/>
           </a:p>
@@ -1172,7 +1181,7 @@
           <a:p>
             <a:fld id="{43208139-D7BC-4419-A81A-A3FD5F89F6CD}" type="datetimeFigureOut">
               <a:rPr lang="en-GB" smtClean="0"/>
-              <a:t>21/11/2023</a:t>
+              <a:t>23/11/2023</a:t>
             </a:fld>
             <a:endParaRPr lang="en-GB"/>
           </a:p>
@@ -1440,7 +1449,7 @@
           <a:p>
             <a:fld id="{43208139-D7BC-4419-A81A-A3FD5F89F6CD}" type="datetimeFigureOut">
               <a:rPr lang="en-GB" smtClean="0"/>
-              <a:t>21/11/2023</a:t>
+              <a:t>23/11/2023</a:t>
             </a:fld>
             <a:endParaRPr lang="en-GB"/>
           </a:p>
@@ -1855,7 +1864,7 @@
           <a:p>
             <a:fld id="{43208139-D7BC-4419-A81A-A3FD5F89F6CD}" type="datetimeFigureOut">
               <a:rPr lang="en-GB" smtClean="0"/>
-              <a:t>21/11/2023</a:t>
+              <a:t>23/11/2023</a:t>
             </a:fld>
             <a:endParaRPr lang="en-GB"/>
           </a:p>
@@ -1997,7 +2006,7 @@
           <a:p>
             <a:fld id="{43208139-D7BC-4419-A81A-A3FD5F89F6CD}" type="datetimeFigureOut">
               <a:rPr lang="en-GB" smtClean="0"/>
-              <a:t>21/11/2023</a:t>
+              <a:t>23/11/2023</a:t>
             </a:fld>
             <a:endParaRPr lang="en-GB"/>
           </a:p>
@@ -2110,7 +2119,7 @@
           <a:p>
             <a:fld id="{43208139-D7BC-4419-A81A-A3FD5F89F6CD}" type="datetimeFigureOut">
               <a:rPr lang="en-GB" smtClean="0"/>
-              <a:t>21/11/2023</a:t>
+              <a:t>23/11/2023</a:t>
             </a:fld>
             <a:endParaRPr lang="en-GB"/>
           </a:p>
@@ -2423,7 +2432,7 @@
           <a:p>
             <a:fld id="{43208139-D7BC-4419-A81A-A3FD5F89F6CD}" type="datetimeFigureOut">
               <a:rPr lang="en-GB" smtClean="0"/>
-              <a:t>21/11/2023</a:t>
+              <a:t>23/11/2023</a:t>
             </a:fld>
             <a:endParaRPr lang="en-GB"/>
           </a:p>
@@ -2712,7 +2721,7 @@
           <a:p>
             <a:fld id="{43208139-D7BC-4419-A81A-A3FD5F89F6CD}" type="datetimeFigureOut">
               <a:rPr lang="en-GB" smtClean="0"/>
-              <a:t>21/11/2023</a:t>
+              <a:t>23/11/2023</a:t>
             </a:fld>
             <a:endParaRPr lang="en-GB"/>
           </a:p>
@@ -2955,7 +2964,7 @@
           <a:p>
             <a:fld id="{43208139-D7BC-4419-A81A-A3FD5F89F6CD}" type="datetimeFigureOut">
               <a:rPr lang="en-GB" smtClean="0"/>
-              <a:t>21/11/2023</a:t>
+              <a:t>23/11/2023</a:t>
             </a:fld>
             <a:endParaRPr lang="en-GB"/>
           </a:p>
@@ -6163,7 +6172,7 @@
           <a:p>
             <a:r>
               <a:rPr lang="en-US" dirty="0"/>
-              <a:t>Order project &amp; knowledge transfer</a:t>
+              <a:t>Organize project &amp; transfer knowledge</a:t>
             </a:r>
             <a:endParaRPr lang="en-GB" dirty="0"/>
           </a:p>
@@ -6173,6 +6182,302 @@
     <p:extLst>
       <p:ext uri="{BB962C8B-B14F-4D97-AF65-F5344CB8AC3E}">
         <p14:creationId xmlns:p14="http://schemas.microsoft.com/office/powerpoint/2010/main" val="3645914465"/>
+      </p:ext>
+    </p:extLst>
+  </p:cSld>
+  <p:clrMapOvr>
+    <a:masterClrMapping/>
+  </p:clrMapOvr>
+</p:sld>
+</file>
+
+<file path=ppt/slides/slide27.xml><?xml version="1.0" encoding="utf-8"?>
+<p:sld xmlns:a="http://schemas.openxmlformats.org/drawingml/2006/main" xmlns:r="http://schemas.openxmlformats.org/officeDocument/2006/relationships" xmlns:p="http://schemas.openxmlformats.org/presentationml/2006/main">
+  <p:cSld>
+    <p:spTree>
+      <p:nvGrpSpPr>
+        <p:cNvPr id="1" name=""/>
+        <p:cNvGrpSpPr/>
+        <p:nvPr/>
+      </p:nvGrpSpPr>
+      <p:grpSpPr>
+        <a:xfrm>
+          <a:off x="0" y="0"/>
+          <a:ext cx="0" cy="0"/>
+          <a:chOff x="0" y="0"/>
+          <a:chExt cx="0" cy="0"/>
+        </a:xfrm>
+      </p:grpSpPr>
+      <p:sp>
+        <p:nvSpPr>
+          <p:cNvPr id="2" name="Title 1">
+            <a:extLst>
+              <a:ext uri="{FF2B5EF4-FFF2-40B4-BE49-F238E27FC236}">
+                <a16:creationId xmlns:a16="http://schemas.microsoft.com/office/drawing/2014/main" id="{153FE02A-ADC8-D398-59CF-765F2CBD37B4}"/>
+              </a:ext>
+            </a:extLst>
+          </p:cNvPr>
+          <p:cNvSpPr>
+            <a:spLocks noGrp="1"/>
+          </p:cNvSpPr>
+          <p:nvPr>
+            <p:ph type="ctrTitle"/>
+          </p:nvPr>
+        </p:nvSpPr>
+        <p:spPr/>
+        <p:txBody>
+          <a:bodyPr/>
+          <a:lstStyle/>
+          <a:p>
+            <a:r>
+              <a:rPr lang="en-US" dirty="0"/>
+              <a:t>Bonus</a:t>
+            </a:r>
+            <a:endParaRPr lang="en-GB" dirty="0"/>
+          </a:p>
+        </p:txBody>
+      </p:sp>
+    </p:spTree>
+    <p:extLst>
+      <p:ext uri="{BB962C8B-B14F-4D97-AF65-F5344CB8AC3E}">
+        <p14:creationId xmlns:p14="http://schemas.microsoft.com/office/powerpoint/2010/main" val="2921150880"/>
+      </p:ext>
+    </p:extLst>
+  </p:cSld>
+  <p:clrMapOvr>
+    <a:masterClrMapping/>
+  </p:clrMapOvr>
+</p:sld>
+</file>
+
+<file path=ppt/slides/slide28.xml><?xml version="1.0" encoding="utf-8"?>
+<p:sld xmlns:a="http://schemas.openxmlformats.org/drawingml/2006/main" xmlns:r="http://schemas.openxmlformats.org/officeDocument/2006/relationships" xmlns:p="http://schemas.openxmlformats.org/presentationml/2006/main">
+  <p:cSld>
+    <p:spTree>
+      <p:nvGrpSpPr>
+        <p:cNvPr id="1" name=""/>
+        <p:cNvGrpSpPr/>
+        <p:nvPr/>
+      </p:nvGrpSpPr>
+      <p:grpSpPr>
+        <a:xfrm>
+          <a:off x="0" y="0"/>
+          <a:ext cx="0" cy="0"/>
+          <a:chOff x="0" y="0"/>
+          <a:chExt cx="0" cy="0"/>
+        </a:xfrm>
+      </p:grpSpPr>
+      <p:sp>
+        <p:nvSpPr>
+          <p:cNvPr id="2" name="Title 1">
+            <a:extLst>
+              <a:ext uri="{FF2B5EF4-FFF2-40B4-BE49-F238E27FC236}">
+                <a16:creationId xmlns:a16="http://schemas.microsoft.com/office/drawing/2014/main" id="{3A532D5F-4C6F-EC2C-6A90-BDA637AE8089}"/>
+              </a:ext>
+            </a:extLst>
+          </p:cNvPr>
+          <p:cNvSpPr>
+            <a:spLocks noGrp="1"/>
+          </p:cNvSpPr>
+          <p:nvPr>
+            <p:ph type="title"/>
+          </p:nvPr>
+        </p:nvSpPr>
+        <p:spPr>
+          <a:xfrm>
+            <a:off x="165370" y="365125"/>
+            <a:ext cx="3657600" cy="5996764"/>
+          </a:xfrm>
+        </p:spPr>
+        <p:txBody>
+          <a:bodyPr>
+            <a:normAutofit/>
+          </a:bodyPr>
+          <a:lstStyle/>
+          <a:p>
+            <a:r>
+              <a:rPr lang="en-US" dirty="0"/>
+              <a:t>Min</a:t>
+            </a:r>
+            <a:br>
+              <a:rPr lang="en-US" dirty="0"/>
+            </a:br>
+            <a:r>
+              <a:rPr lang="en-US" dirty="0"/>
+              <a:t>with constraint</a:t>
+            </a:r>
+            <a:br>
+              <a:rPr lang="en-US" dirty="0"/>
+            </a:br>
+            <a:r>
+              <a:rPr lang="en-US" dirty="0"/>
+              <a:t>Vs.</a:t>
+            </a:r>
+            <a:br>
+              <a:rPr lang="en-US" dirty="0"/>
+            </a:br>
+            <a:r>
+              <a:rPr lang="en-US" dirty="0"/>
+              <a:t>Mean</a:t>
+            </a:r>
+            <a:br>
+              <a:rPr lang="en-US" dirty="0"/>
+            </a:br>
+            <a:r>
+              <a:rPr lang="en-US" dirty="0"/>
+              <a:t>with constraint</a:t>
+            </a:r>
+            <a:endParaRPr lang="en-GB" dirty="0"/>
+          </a:p>
+        </p:txBody>
+      </p:sp>
+      <p:pic>
+        <p:nvPicPr>
+          <p:cNvPr id="6" name="Picture 5">
+            <a:extLst>
+              <a:ext uri="{FF2B5EF4-FFF2-40B4-BE49-F238E27FC236}">
+                <a16:creationId xmlns:a16="http://schemas.microsoft.com/office/drawing/2014/main" id="{A22C1BE2-6853-6EA6-C618-AA81B31C141B}"/>
+              </a:ext>
+            </a:extLst>
+          </p:cNvPr>
+          <p:cNvPicPr>
+            <a:picLocks noChangeAspect="1"/>
+          </p:cNvPicPr>
+          <p:nvPr/>
+        </p:nvPicPr>
+        <p:blipFill>
+          <a:blip r:embed="rId2"/>
+          <a:stretch>
+            <a:fillRect/>
+          </a:stretch>
+        </p:blipFill>
+        <p:spPr>
+          <a:xfrm>
+            <a:off x="4054205" y="368300"/>
+            <a:ext cx="7972425" cy="6124575"/>
+          </a:xfrm>
+          <a:prstGeom prst="rect">
+            <a:avLst/>
+          </a:prstGeom>
+        </p:spPr>
+      </p:pic>
+    </p:spTree>
+    <p:extLst>
+      <p:ext uri="{BB962C8B-B14F-4D97-AF65-F5344CB8AC3E}">
+        <p14:creationId xmlns:p14="http://schemas.microsoft.com/office/powerpoint/2010/main" val="1075677631"/>
+      </p:ext>
+    </p:extLst>
+  </p:cSld>
+  <p:clrMapOvr>
+    <a:masterClrMapping/>
+  </p:clrMapOvr>
+</p:sld>
+</file>
+
+<file path=ppt/slides/slide29.xml><?xml version="1.0" encoding="utf-8"?>
+<p:sld xmlns:a="http://schemas.openxmlformats.org/drawingml/2006/main" xmlns:r="http://schemas.openxmlformats.org/officeDocument/2006/relationships" xmlns:p="http://schemas.openxmlformats.org/presentationml/2006/main">
+  <p:cSld>
+    <p:spTree>
+      <p:nvGrpSpPr>
+        <p:cNvPr id="1" name=""/>
+        <p:cNvGrpSpPr/>
+        <p:nvPr/>
+      </p:nvGrpSpPr>
+      <p:grpSpPr>
+        <a:xfrm>
+          <a:off x="0" y="0"/>
+          <a:ext cx="0" cy="0"/>
+          <a:chOff x="0" y="0"/>
+          <a:chExt cx="0" cy="0"/>
+        </a:xfrm>
+      </p:grpSpPr>
+      <p:sp>
+        <p:nvSpPr>
+          <p:cNvPr id="2" name="Title 1">
+            <a:extLst>
+              <a:ext uri="{FF2B5EF4-FFF2-40B4-BE49-F238E27FC236}">
+                <a16:creationId xmlns:a16="http://schemas.microsoft.com/office/drawing/2014/main" id="{3A532D5F-4C6F-EC2C-6A90-BDA637AE8089}"/>
+              </a:ext>
+            </a:extLst>
+          </p:cNvPr>
+          <p:cNvSpPr>
+            <a:spLocks noGrp="1"/>
+          </p:cNvSpPr>
+          <p:nvPr>
+            <p:ph type="title"/>
+          </p:nvPr>
+        </p:nvSpPr>
+        <p:spPr>
+          <a:xfrm>
+            <a:off x="165370" y="365125"/>
+            <a:ext cx="3657600" cy="5996764"/>
+          </a:xfrm>
+        </p:spPr>
+        <p:txBody>
+          <a:bodyPr>
+            <a:normAutofit/>
+          </a:bodyPr>
+          <a:lstStyle/>
+          <a:p>
+            <a:r>
+              <a:rPr lang="en-US" dirty="0"/>
+              <a:t>Min</a:t>
+            </a:r>
+            <a:br>
+              <a:rPr lang="en-US" dirty="0"/>
+            </a:br>
+            <a:r>
+              <a:rPr lang="en-US" dirty="0"/>
+              <a:t>Vs.</a:t>
+            </a:r>
+            <a:br>
+              <a:rPr lang="en-US" dirty="0"/>
+            </a:br>
+            <a:r>
+              <a:rPr lang="en-US" dirty="0"/>
+              <a:t>Mean</a:t>
+            </a:r>
+            <a:br>
+              <a:rPr lang="en-US" dirty="0"/>
+            </a:br>
+            <a:endParaRPr lang="en-GB" dirty="0"/>
+          </a:p>
+        </p:txBody>
+      </p:sp>
+      <p:pic>
+        <p:nvPicPr>
+          <p:cNvPr id="4" name="Picture 3">
+            <a:extLst>
+              <a:ext uri="{FF2B5EF4-FFF2-40B4-BE49-F238E27FC236}">
+                <a16:creationId xmlns:a16="http://schemas.microsoft.com/office/drawing/2014/main" id="{D3A84772-C531-50BA-9054-9C8B2817177C}"/>
+              </a:ext>
+            </a:extLst>
+          </p:cNvPr>
+          <p:cNvPicPr>
+            <a:picLocks noChangeAspect="1"/>
+          </p:cNvPicPr>
+          <p:nvPr/>
+        </p:nvPicPr>
+        <p:blipFill>
+          <a:blip r:embed="rId2"/>
+          <a:stretch>
+            <a:fillRect/>
+          </a:stretch>
+        </p:blipFill>
+        <p:spPr>
+          <a:xfrm>
+            <a:off x="4158980" y="365125"/>
+            <a:ext cx="7867650" cy="6048375"/>
+          </a:xfrm>
+          <a:prstGeom prst="rect">
+            <a:avLst/>
+          </a:prstGeom>
+        </p:spPr>
+      </p:pic>
+    </p:spTree>
+    <p:extLst>
+      <p:ext uri="{BB962C8B-B14F-4D97-AF65-F5344CB8AC3E}">
+        <p14:creationId xmlns:p14="http://schemas.microsoft.com/office/powerpoint/2010/main" val="640017438"/>
       </p:ext>
     </p:extLst>
   </p:cSld>
@@ -6455,6 +6760,684 @@
     <p:extLst>
       <p:ext uri="{BB962C8B-B14F-4D97-AF65-F5344CB8AC3E}">
         <p14:creationId xmlns:p14="http://schemas.microsoft.com/office/powerpoint/2010/main" val="3402519196"/>
+      </p:ext>
+    </p:extLst>
+  </p:cSld>
+  <p:clrMapOvr>
+    <a:masterClrMapping/>
+  </p:clrMapOvr>
+</p:sld>
+</file>
+
+<file path=ppt/slides/slide30.xml><?xml version="1.0" encoding="utf-8"?>
+<p:sld xmlns:a="http://schemas.openxmlformats.org/drawingml/2006/main" xmlns:r="http://schemas.openxmlformats.org/officeDocument/2006/relationships" xmlns:p="http://schemas.openxmlformats.org/presentationml/2006/main">
+  <p:cSld>
+    <p:spTree>
+      <p:nvGrpSpPr>
+        <p:cNvPr id="1" name=""/>
+        <p:cNvGrpSpPr/>
+        <p:nvPr/>
+      </p:nvGrpSpPr>
+      <p:grpSpPr>
+        <a:xfrm>
+          <a:off x="0" y="0"/>
+          <a:ext cx="0" cy="0"/>
+          <a:chOff x="0" y="0"/>
+          <a:chExt cx="0" cy="0"/>
+        </a:xfrm>
+      </p:grpSpPr>
+      <p:sp>
+        <p:nvSpPr>
+          <p:cNvPr id="2" name="Title 1">
+            <a:extLst>
+              <a:ext uri="{FF2B5EF4-FFF2-40B4-BE49-F238E27FC236}">
+                <a16:creationId xmlns:a16="http://schemas.microsoft.com/office/drawing/2014/main" id="{3A532D5F-4C6F-EC2C-6A90-BDA637AE8089}"/>
+              </a:ext>
+            </a:extLst>
+          </p:cNvPr>
+          <p:cNvSpPr>
+            <a:spLocks noGrp="1"/>
+          </p:cNvSpPr>
+          <p:nvPr>
+            <p:ph type="title"/>
+          </p:nvPr>
+        </p:nvSpPr>
+        <p:spPr>
+          <a:xfrm>
+            <a:off x="165370" y="365125"/>
+            <a:ext cx="3657600" cy="5996764"/>
+          </a:xfrm>
+        </p:spPr>
+        <p:txBody>
+          <a:bodyPr>
+            <a:normAutofit/>
+          </a:bodyPr>
+          <a:lstStyle/>
+          <a:p>
+            <a:r>
+              <a:rPr lang="en-US" dirty="0"/>
+              <a:t>Multiplicative</a:t>
+            </a:r>
+            <a:br>
+              <a:rPr lang="en-US" dirty="0"/>
+            </a:br>
+            <a:r>
+              <a:rPr lang="en-US" dirty="0"/>
+              <a:t>Vs.</a:t>
+            </a:r>
+            <a:br>
+              <a:rPr lang="en-US" dirty="0"/>
+            </a:br>
+            <a:r>
+              <a:rPr lang="en-US" dirty="0"/>
+              <a:t>Null</a:t>
+            </a:r>
+            <a:br>
+              <a:rPr lang="en-US" dirty="0"/>
+            </a:br>
+            <a:endParaRPr lang="en-GB" dirty="0"/>
+          </a:p>
+        </p:txBody>
+      </p:sp>
+      <p:pic>
+        <p:nvPicPr>
+          <p:cNvPr id="5" name="Picture 4">
+            <a:extLst>
+              <a:ext uri="{FF2B5EF4-FFF2-40B4-BE49-F238E27FC236}">
+                <a16:creationId xmlns:a16="http://schemas.microsoft.com/office/drawing/2014/main" id="{79685C6A-B736-076A-FE64-FC3249510353}"/>
+              </a:ext>
+            </a:extLst>
+          </p:cNvPr>
+          <p:cNvPicPr>
+            <a:picLocks noChangeAspect="1"/>
+          </p:cNvPicPr>
+          <p:nvPr/>
+        </p:nvPicPr>
+        <p:blipFill>
+          <a:blip r:embed="rId2"/>
+          <a:stretch>
+            <a:fillRect/>
+          </a:stretch>
+        </p:blipFill>
+        <p:spPr>
+          <a:xfrm>
+            <a:off x="4178030" y="219075"/>
+            <a:ext cx="7848600" cy="6419850"/>
+          </a:xfrm>
+          <a:prstGeom prst="rect">
+            <a:avLst/>
+          </a:prstGeom>
+        </p:spPr>
+      </p:pic>
+    </p:spTree>
+    <p:extLst>
+      <p:ext uri="{BB962C8B-B14F-4D97-AF65-F5344CB8AC3E}">
+        <p14:creationId xmlns:p14="http://schemas.microsoft.com/office/powerpoint/2010/main" val="4263767450"/>
+      </p:ext>
+    </p:extLst>
+  </p:cSld>
+  <p:clrMapOvr>
+    <a:masterClrMapping/>
+  </p:clrMapOvr>
+</p:sld>
+</file>
+
+<file path=ppt/slides/slide31.xml><?xml version="1.0" encoding="utf-8"?>
+<p:sld xmlns:a="http://schemas.openxmlformats.org/drawingml/2006/main" xmlns:r="http://schemas.openxmlformats.org/officeDocument/2006/relationships" xmlns:p="http://schemas.openxmlformats.org/presentationml/2006/main">
+  <p:cSld>
+    <p:spTree>
+      <p:nvGrpSpPr>
+        <p:cNvPr id="1" name=""/>
+        <p:cNvGrpSpPr/>
+        <p:nvPr/>
+      </p:nvGrpSpPr>
+      <p:grpSpPr>
+        <a:xfrm>
+          <a:off x="0" y="0"/>
+          <a:ext cx="0" cy="0"/>
+          <a:chOff x="0" y="0"/>
+          <a:chExt cx="0" cy="0"/>
+        </a:xfrm>
+      </p:grpSpPr>
+      <p:sp>
+        <p:nvSpPr>
+          <p:cNvPr id="2" name="Title 1">
+            <a:extLst>
+              <a:ext uri="{FF2B5EF4-FFF2-40B4-BE49-F238E27FC236}">
+                <a16:creationId xmlns:a16="http://schemas.microsoft.com/office/drawing/2014/main" id="{3A532D5F-4C6F-EC2C-6A90-BDA637AE8089}"/>
+              </a:ext>
+            </a:extLst>
+          </p:cNvPr>
+          <p:cNvSpPr>
+            <a:spLocks noGrp="1"/>
+          </p:cNvSpPr>
+          <p:nvPr>
+            <p:ph type="title"/>
+          </p:nvPr>
+        </p:nvSpPr>
+        <p:spPr>
+          <a:xfrm>
+            <a:off x="165370" y="365125"/>
+            <a:ext cx="3657600" cy="5996764"/>
+          </a:xfrm>
+        </p:spPr>
+        <p:txBody>
+          <a:bodyPr>
+            <a:normAutofit/>
+          </a:bodyPr>
+          <a:lstStyle/>
+          <a:p>
+            <a:r>
+              <a:rPr lang="en-US" dirty="0"/>
+              <a:t>Multiplicative</a:t>
+            </a:r>
+            <a:br>
+              <a:rPr lang="en-US" dirty="0"/>
+            </a:br>
+            <a:r>
+              <a:rPr lang="en-US" dirty="0"/>
+              <a:t>Vs.</a:t>
+            </a:r>
+            <a:br>
+              <a:rPr lang="en-US" dirty="0"/>
+            </a:br>
+            <a:r>
+              <a:rPr lang="en-US" dirty="0"/>
+              <a:t>Min</a:t>
+            </a:r>
+            <a:br>
+              <a:rPr lang="en-US" dirty="0"/>
+            </a:br>
+            <a:endParaRPr lang="en-GB" dirty="0"/>
+          </a:p>
+        </p:txBody>
+      </p:sp>
+      <p:pic>
+        <p:nvPicPr>
+          <p:cNvPr id="4" name="Picture 3">
+            <a:extLst>
+              <a:ext uri="{FF2B5EF4-FFF2-40B4-BE49-F238E27FC236}">
+                <a16:creationId xmlns:a16="http://schemas.microsoft.com/office/drawing/2014/main" id="{88BEFAF0-ECA5-B09B-6F3A-756E5E78759B}"/>
+              </a:ext>
+            </a:extLst>
+          </p:cNvPr>
+          <p:cNvPicPr>
+            <a:picLocks noChangeAspect="1"/>
+          </p:cNvPicPr>
+          <p:nvPr/>
+        </p:nvPicPr>
+        <p:blipFill>
+          <a:blip r:embed="rId2"/>
+          <a:stretch>
+            <a:fillRect/>
+          </a:stretch>
+        </p:blipFill>
+        <p:spPr>
+          <a:xfrm>
+            <a:off x="4149455" y="129769"/>
+            <a:ext cx="7877175" cy="6467475"/>
+          </a:xfrm>
+          <a:prstGeom prst="rect">
+            <a:avLst/>
+          </a:prstGeom>
+        </p:spPr>
+      </p:pic>
+    </p:spTree>
+    <p:extLst>
+      <p:ext uri="{BB962C8B-B14F-4D97-AF65-F5344CB8AC3E}">
+        <p14:creationId xmlns:p14="http://schemas.microsoft.com/office/powerpoint/2010/main" val="105201597"/>
+      </p:ext>
+    </p:extLst>
+  </p:cSld>
+  <p:clrMapOvr>
+    <a:masterClrMapping/>
+  </p:clrMapOvr>
+</p:sld>
+</file>
+
+<file path=ppt/slides/slide32.xml><?xml version="1.0" encoding="utf-8"?>
+<p:sld xmlns:a="http://schemas.openxmlformats.org/drawingml/2006/main" xmlns:r="http://schemas.openxmlformats.org/officeDocument/2006/relationships" xmlns:p="http://schemas.openxmlformats.org/presentationml/2006/main">
+  <p:cSld>
+    <p:spTree>
+      <p:nvGrpSpPr>
+        <p:cNvPr id="1" name=""/>
+        <p:cNvGrpSpPr/>
+        <p:nvPr/>
+      </p:nvGrpSpPr>
+      <p:grpSpPr>
+        <a:xfrm>
+          <a:off x="0" y="0"/>
+          <a:ext cx="0" cy="0"/>
+          <a:chOff x="0" y="0"/>
+          <a:chExt cx="0" cy="0"/>
+        </a:xfrm>
+      </p:grpSpPr>
+      <p:sp>
+        <p:nvSpPr>
+          <p:cNvPr id="2" name="Title 1">
+            <a:extLst>
+              <a:ext uri="{FF2B5EF4-FFF2-40B4-BE49-F238E27FC236}">
+                <a16:creationId xmlns:a16="http://schemas.microsoft.com/office/drawing/2014/main" id="{3A532D5F-4C6F-EC2C-6A90-BDA637AE8089}"/>
+              </a:ext>
+            </a:extLst>
+          </p:cNvPr>
+          <p:cNvSpPr>
+            <a:spLocks noGrp="1"/>
+          </p:cNvSpPr>
+          <p:nvPr>
+            <p:ph type="title"/>
+          </p:nvPr>
+        </p:nvSpPr>
+        <p:spPr>
+          <a:xfrm>
+            <a:off x="165370" y="365125"/>
+            <a:ext cx="3657600" cy="5996764"/>
+          </a:xfrm>
+        </p:spPr>
+        <p:txBody>
+          <a:bodyPr>
+            <a:normAutofit/>
+          </a:bodyPr>
+          <a:lstStyle/>
+          <a:p>
+            <a:r>
+              <a:rPr lang="en-US" dirty="0"/>
+              <a:t>Multiplicative</a:t>
+            </a:r>
+            <a:br>
+              <a:rPr lang="en-US" dirty="0"/>
+            </a:br>
+            <a:r>
+              <a:rPr lang="en-US" dirty="0"/>
+              <a:t>Vs.</a:t>
+            </a:r>
+            <a:br>
+              <a:rPr lang="en-US" dirty="0"/>
+            </a:br>
+            <a:r>
+              <a:rPr lang="en-US" dirty="0"/>
+              <a:t>Mean</a:t>
+            </a:r>
+            <a:br>
+              <a:rPr lang="en-US" dirty="0"/>
+            </a:br>
+            <a:endParaRPr lang="en-GB" dirty="0"/>
+          </a:p>
+        </p:txBody>
+      </p:sp>
+      <p:pic>
+        <p:nvPicPr>
+          <p:cNvPr id="4" name="Picture 3">
+            <a:extLst>
+              <a:ext uri="{FF2B5EF4-FFF2-40B4-BE49-F238E27FC236}">
+                <a16:creationId xmlns:a16="http://schemas.microsoft.com/office/drawing/2014/main" id="{9DDB102D-8E49-787C-B630-32A01934590A}"/>
+              </a:ext>
+            </a:extLst>
+          </p:cNvPr>
+          <p:cNvPicPr>
+            <a:picLocks noChangeAspect="1"/>
+          </p:cNvPicPr>
+          <p:nvPr/>
+        </p:nvPicPr>
+        <p:blipFill>
+          <a:blip r:embed="rId2"/>
+          <a:stretch>
+            <a:fillRect/>
+          </a:stretch>
+        </p:blipFill>
+        <p:spPr>
+          <a:xfrm>
+            <a:off x="4082780" y="252412"/>
+            <a:ext cx="7943850" cy="6353175"/>
+          </a:xfrm>
+          <a:prstGeom prst="rect">
+            <a:avLst/>
+          </a:prstGeom>
+        </p:spPr>
+      </p:pic>
+    </p:spTree>
+    <p:extLst>
+      <p:ext uri="{BB962C8B-B14F-4D97-AF65-F5344CB8AC3E}">
+        <p14:creationId xmlns:p14="http://schemas.microsoft.com/office/powerpoint/2010/main" val="3523805584"/>
+      </p:ext>
+    </p:extLst>
+  </p:cSld>
+  <p:clrMapOvr>
+    <a:masterClrMapping/>
+  </p:clrMapOvr>
+</p:sld>
+</file>
+
+<file path=ppt/slides/slide33.xml><?xml version="1.0" encoding="utf-8"?>
+<p:sld xmlns:a="http://schemas.openxmlformats.org/drawingml/2006/main" xmlns:r="http://schemas.openxmlformats.org/officeDocument/2006/relationships" xmlns:p="http://schemas.openxmlformats.org/presentationml/2006/main">
+  <p:cSld>
+    <p:spTree>
+      <p:nvGrpSpPr>
+        <p:cNvPr id="1" name=""/>
+        <p:cNvGrpSpPr/>
+        <p:nvPr/>
+      </p:nvGrpSpPr>
+      <p:grpSpPr>
+        <a:xfrm>
+          <a:off x="0" y="0"/>
+          <a:ext cx="0" cy="0"/>
+          <a:chOff x="0" y="0"/>
+          <a:chExt cx="0" cy="0"/>
+        </a:xfrm>
+      </p:grpSpPr>
+      <p:sp>
+        <p:nvSpPr>
+          <p:cNvPr id="2" name="Title 1">
+            <a:extLst>
+              <a:ext uri="{FF2B5EF4-FFF2-40B4-BE49-F238E27FC236}">
+                <a16:creationId xmlns:a16="http://schemas.microsoft.com/office/drawing/2014/main" id="{3A532D5F-4C6F-EC2C-6A90-BDA637AE8089}"/>
+              </a:ext>
+            </a:extLst>
+          </p:cNvPr>
+          <p:cNvSpPr>
+            <a:spLocks noGrp="1"/>
+          </p:cNvSpPr>
+          <p:nvPr>
+            <p:ph type="title"/>
+          </p:nvPr>
+        </p:nvSpPr>
+        <p:spPr>
+          <a:xfrm>
+            <a:off x="165370" y="365125"/>
+            <a:ext cx="3657600" cy="5996764"/>
+          </a:xfrm>
+        </p:spPr>
+        <p:txBody>
+          <a:bodyPr>
+            <a:normAutofit/>
+          </a:bodyPr>
+          <a:lstStyle/>
+          <a:p>
+            <a:r>
+              <a:rPr lang="en-US" dirty="0"/>
+              <a:t>Multiplicative</a:t>
+            </a:r>
+            <a:br>
+              <a:rPr lang="en-US" dirty="0"/>
+            </a:br>
+            <a:r>
+              <a:rPr lang="en-US" dirty="0"/>
+              <a:t>Vs.</a:t>
+            </a:r>
+            <a:br>
+              <a:rPr lang="en-US" dirty="0"/>
+            </a:br>
+            <a:r>
+              <a:rPr lang="en-US" dirty="0"/>
+              <a:t>Temporal-Only</a:t>
+            </a:r>
+            <a:br>
+              <a:rPr lang="en-US" dirty="0"/>
+            </a:br>
+            <a:endParaRPr lang="en-GB" dirty="0"/>
+          </a:p>
+        </p:txBody>
+      </p:sp>
+      <p:pic>
+        <p:nvPicPr>
+          <p:cNvPr id="4" name="Picture 3">
+            <a:extLst>
+              <a:ext uri="{FF2B5EF4-FFF2-40B4-BE49-F238E27FC236}">
+                <a16:creationId xmlns:a16="http://schemas.microsoft.com/office/drawing/2014/main" id="{879D1F61-7C0B-FB17-531A-26F93C0E07AB}"/>
+              </a:ext>
+            </a:extLst>
+          </p:cNvPr>
+          <p:cNvPicPr>
+            <a:picLocks noChangeAspect="1"/>
+          </p:cNvPicPr>
+          <p:nvPr/>
+        </p:nvPicPr>
+        <p:blipFill>
+          <a:blip r:embed="rId2"/>
+          <a:stretch>
+            <a:fillRect/>
+          </a:stretch>
+        </p:blipFill>
+        <p:spPr>
+          <a:xfrm>
+            <a:off x="4168505" y="125007"/>
+            <a:ext cx="7858125" cy="6477000"/>
+          </a:xfrm>
+          <a:prstGeom prst="rect">
+            <a:avLst/>
+          </a:prstGeom>
+        </p:spPr>
+      </p:pic>
+    </p:spTree>
+    <p:extLst>
+      <p:ext uri="{BB962C8B-B14F-4D97-AF65-F5344CB8AC3E}">
+        <p14:creationId xmlns:p14="http://schemas.microsoft.com/office/powerpoint/2010/main" val="3497028618"/>
+      </p:ext>
+    </p:extLst>
+  </p:cSld>
+  <p:clrMapOvr>
+    <a:masterClrMapping/>
+  </p:clrMapOvr>
+</p:sld>
+</file>
+
+<file path=ppt/slides/slide34.xml><?xml version="1.0" encoding="utf-8"?>
+<p:sld xmlns:a="http://schemas.openxmlformats.org/drawingml/2006/main" xmlns:r="http://schemas.openxmlformats.org/officeDocument/2006/relationships" xmlns:p="http://schemas.openxmlformats.org/presentationml/2006/main">
+  <p:cSld>
+    <p:spTree>
+      <p:nvGrpSpPr>
+        <p:cNvPr id="1" name=""/>
+        <p:cNvGrpSpPr/>
+        <p:nvPr/>
+      </p:nvGrpSpPr>
+      <p:grpSpPr>
+        <a:xfrm>
+          <a:off x="0" y="0"/>
+          <a:ext cx="0" cy="0"/>
+          <a:chOff x="0" y="0"/>
+          <a:chExt cx="0" cy="0"/>
+        </a:xfrm>
+      </p:grpSpPr>
+      <p:sp>
+        <p:nvSpPr>
+          <p:cNvPr id="2" name="Title 1">
+            <a:extLst>
+              <a:ext uri="{FF2B5EF4-FFF2-40B4-BE49-F238E27FC236}">
+                <a16:creationId xmlns:a16="http://schemas.microsoft.com/office/drawing/2014/main" id="{3A532D5F-4C6F-EC2C-6A90-BDA637AE8089}"/>
+              </a:ext>
+            </a:extLst>
+          </p:cNvPr>
+          <p:cNvSpPr>
+            <a:spLocks noGrp="1"/>
+          </p:cNvSpPr>
+          <p:nvPr>
+            <p:ph type="title"/>
+          </p:nvPr>
+        </p:nvSpPr>
+        <p:spPr>
+          <a:xfrm>
+            <a:off x="165370" y="365125"/>
+            <a:ext cx="3657600" cy="5996764"/>
+          </a:xfrm>
+        </p:spPr>
+        <p:txBody>
+          <a:bodyPr>
+            <a:normAutofit/>
+          </a:bodyPr>
+          <a:lstStyle/>
+          <a:p>
+            <a:r>
+              <a:rPr lang="en-US" dirty="0"/>
+              <a:t>Multiplicative</a:t>
+            </a:r>
+            <a:br>
+              <a:rPr lang="en-US" dirty="0"/>
+            </a:br>
+            <a:r>
+              <a:rPr lang="en-US" dirty="0"/>
+              <a:t>Vs.</a:t>
+            </a:r>
+            <a:br>
+              <a:rPr lang="en-US" dirty="0"/>
+            </a:br>
+            <a:r>
+              <a:rPr lang="en-US" dirty="0"/>
+              <a:t>Spatial-Only</a:t>
+            </a:r>
+            <a:br>
+              <a:rPr lang="en-US" dirty="0"/>
+            </a:br>
+            <a:endParaRPr lang="en-GB" dirty="0"/>
+          </a:p>
+        </p:txBody>
+      </p:sp>
+      <p:pic>
+        <p:nvPicPr>
+          <p:cNvPr id="4" name="Picture 3">
+            <a:extLst>
+              <a:ext uri="{FF2B5EF4-FFF2-40B4-BE49-F238E27FC236}">
+                <a16:creationId xmlns:a16="http://schemas.microsoft.com/office/drawing/2014/main" id="{72FEF3BF-B77B-F10A-8CBE-1DCF178B0D7B}"/>
+              </a:ext>
+            </a:extLst>
+          </p:cNvPr>
+          <p:cNvPicPr>
+            <a:picLocks noChangeAspect="1"/>
+          </p:cNvPicPr>
+          <p:nvPr/>
+        </p:nvPicPr>
+        <p:blipFill>
+          <a:blip r:embed="rId2"/>
+          <a:stretch>
+            <a:fillRect/>
+          </a:stretch>
+        </p:blipFill>
+        <p:spPr>
+          <a:xfrm>
+            <a:off x="4149455" y="134532"/>
+            <a:ext cx="7877175" cy="6457950"/>
+          </a:xfrm>
+          <a:prstGeom prst="rect">
+            <a:avLst/>
+          </a:prstGeom>
+        </p:spPr>
+      </p:pic>
+    </p:spTree>
+    <p:extLst>
+      <p:ext uri="{BB962C8B-B14F-4D97-AF65-F5344CB8AC3E}">
+        <p14:creationId xmlns:p14="http://schemas.microsoft.com/office/powerpoint/2010/main" val="2029417390"/>
+      </p:ext>
+    </p:extLst>
+  </p:cSld>
+  <p:clrMapOvr>
+    <a:masterClrMapping/>
+  </p:clrMapOvr>
+</p:sld>
+</file>
+
+<file path=ppt/slides/slide35.xml><?xml version="1.0" encoding="utf-8"?>
+<p:sld xmlns:a="http://schemas.openxmlformats.org/drawingml/2006/main" xmlns:r="http://schemas.openxmlformats.org/officeDocument/2006/relationships" xmlns:p="http://schemas.openxmlformats.org/presentationml/2006/main">
+  <p:cSld>
+    <p:spTree>
+      <p:nvGrpSpPr>
+        <p:cNvPr id="1" name=""/>
+        <p:cNvGrpSpPr/>
+        <p:nvPr/>
+      </p:nvGrpSpPr>
+      <p:grpSpPr>
+        <a:xfrm>
+          <a:off x="0" y="0"/>
+          <a:ext cx="0" cy="0"/>
+          <a:chOff x="0" y="0"/>
+          <a:chExt cx="0" cy="0"/>
+        </a:xfrm>
+      </p:grpSpPr>
+      <p:sp>
+        <p:nvSpPr>
+          <p:cNvPr id="2" name="Title 1">
+            <a:extLst>
+              <a:ext uri="{FF2B5EF4-FFF2-40B4-BE49-F238E27FC236}">
+                <a16:creationId xmlns:a16="http://schemas.microsoft.com/office/drawing/2014/main" id="{3A532D5F-4C6F-EC2C-6A90-BDA637AE8089}"/>
+              </a:ext>
+            </a:extLst>
+          </p:cNvPr>
+          <p:cNvSpPr>
+            <a:spLocks noGrp="1"/>
+          </p:cNvSpPr>
+          <p:nvPr>
+            <p:ph type="title"/>
+          </p:nvPr>
+        </p:nvSpPr>
+        <p:spPr>
+          <a:xfrm>
+            <a:off x="165370" y="365125"/>
+            <a:ext cx="3657600" cy="5996764"/>
+          </a:xfrm>
+        </p:spPr>
+        <p:txBody>
+          <a:bodyPr>
+            <a:normAutofit/>
+          </a:bodyPr>
+          <a:lstStyle/>
+          <a:p>
+            <a:r>
+              <a:rPr lang="en-US" dirty="0"/>
+              <a:t>Temporal-Only</a:t>
+            </a:r>
+            <a:br>
+              <a:rPr lang="en-US" dirty="0"/>
+            </a:br>
+            <a:r>
+              <a:rPr lang="en-US" dirty="0"/>
+              <a:t>Vs.</a:t>
+            </a:r>
+            <a:br>
+              <a:rPr lang="en-US" dirty="0"/>
+            </a:br>
+            <a:r>
+              <a:rPr lang="en-US" dirty="0"/>
+              <a:t>Spatial-Only</a:t>
+            </a:r>
+            <a:br>
+              <a:rPr lang="en-US" dirty="0"/>
+            </a:br>
+            <a:endParaRPr lang="en-GB" dirty="0"/>
+          </a:p>
+        </p:txBody>
+      </p:sp>
+      <p:pic>
+        <p:nvPicPr>
+          <p:cNvPr id="4" name="Picture 3">
+            <a:extLst>
+              <a:ext uri="{FF2B5EF4-FFF2-40B4-BE49-F238E27FC236}">
+                <a16:creationId xmlns:a16="http://schemas.microsoft.com/office/drawing/2014/main" id="{D874405E-99BD-7496-48C2-1C5409655554}"/>
+              </a:ext>
+            </a:extLst>
+          </p:cNvPr>
+          <p:cNvPicPr>
+            <a:picLocks noChangeAspect="1"/>
+          </p:cNvPicPr>
+          <p:nvPr/>
+        </p:nvPicPr>
+        <p:blipFill>
+          <a:blip r:embed="rId2"/>
+          <a:stretch>
+            <a:fillRect/>
+          </a:stretch>
+        </p:blipFill>
+        <p:spPr>
+          <a:xfrm>
+            <a:off x="4139930" y="233362"/>
+            <a:ext cx="7886700" cy="6391275"/>
+          </a:xfrm>
+          <a:prstGeom prst="rect">
+            <a:avLst/>
+          </a:prstGeom>
+        </p:spPr>
+      </p:pic>
+    </p:spTree>
+    <p:extLst>
+      <p:ext uri="{BB962C8B-B14F-4D97-AF65-F5344CB8AC3E}">
+        <p14:creationId xmlns:p14="http://schemas.microsoft.com/office/powerpoint/2010/main" val="734046093"/>
       </p:ext>
     </p:extLst>
   </p:cSld>

</xml_diff>